<commit_message>
Update Flashtalk: added transitions, detailed info per slide
</commit_message>
<xml_diff>
--- a/Presentatie/Flashtalk 2 (Jeffrey).pptx
+++ b/Presentatie/Flashtalk 2 (Jeffrey).pptx
@@ -6,10 +6,10 @@
     <p:sldMasterId id="2147483721" r:id="rId2"/>
   </p:sldMasterIdLst>
   <p:notesMasterIdLst>
-    <p:notesMasterId r:id="rId11"/>
+    <p:notesMasterId r:id="rId10"/>
   </p:notesMasterIdLst>
   <p:handoutMasterIdLst>
-    <p:handoutMasterId r:id="rId12"/>
+    <p:handoutMasterId r:id="rId11"/>
   </p:handoutMasterIdLst>
   <p:sldIdLst>
     <p:sldId id="402" r:id="rId3"/>
@@ -19,7 +19,6 @@
     <p:sldId id="408" r:id="rId7"/>
     <p:sldId id="409" r:id="rId8"/>
     <p:sldId id="403" r:id="rId9"/>
-    <p:sldId id="404" r:id="rId10"/>
   </p:sldIdLst>
   <p:sldSz cx="17348200" cy="9756775"/>
   <p:notesSz cx="6858000" cy="9144000"/>
@@ -286,7 +285,7 @@
             <a:fld id="{17A39E9D-B438-D94D-AF2A-93757548558C}" type="datetime1">
               <a:rPr lang="nl-NL" altLang="nl-NL"/>
               <a:pPr/>
-              <a:t>30-5-2017</a:t>
+              <a:t>31-5-2017</a:t>
             </a:fld>
             <a:endParaRPr lang="nl-NL" altLang="nl-NL"/>
           </a:p>
@@ -498,7 +497,7 @@
             <a:fld id="{3AA95554-0BC3-EC48-BCE0-DB850053191D}" type="datetime1">
               <a:rPr lang="nl-NL" altLang="nl-NL"/>
               <a:pPr/>
-              <a:t>30-5-2017</a:t>
+              <a:t>31-5-2017</a:t>
             </a:fld>
             <a:endParaRPr lang="nl-NL" altLang="nl-NL"/>
           </a:p>
@@ -1021,7 +1020,7 @@
           <a:p>
             <a:fld id="{9E1ED08B-741D-9E48-95DA-82644AB503BC}" type="datetime1">
               <a:rPr lang="nl-NL" altLang="nl-NL" smtClean="0"/>
-              <a:t>30-5-2017</a:t>
+              <a:t>31-5-2017</a:t>
             </a:fld>
             <a:endParaRPr lang="nl-NL" altLang="nl-NL"/>
           </a:p>
@@ -1392,7 +1391,7 @@
             <a:fld id="{9E1ED08B-741D-9E48-95DA-82644AB503BC}" type="datetime1">
               <a:rPr lang="nl-NL" altLang="nl-NL" smtClean="0"/>
               <a:pPr/>
-              <a:t>30-5-2017</a:t>
+              <a:t>31-5-2017</a:t>
             </a:fld>
             <a:endParaRPr lang="nl-NL" altLang="nl-NL" dirty="0"/>
           </a:p>
@@ -1634,7 +1633,7 @@
           <a:p>
             <a:fld id="{46CB0545-8C00-A544-A88F-C33FBC7A7630}" type="datetime1">
               <a:rPr lang="nl-NL" altLang="nl-NL" smtClean="0"/>
-              <a:t>30-5-2017</a:t>
+              <a:t>31-5-2017</a:t>
             </a:fld>
             <a:endParaRPr lang="nl-NL" altLang="nl-NL" dirty="0"/>
           </a:p>
@@ -2004,7 +2003,7 @@
           <a:p>
             <a:fld id="{46CB0545-8C00-A544-A88F-C33FBC7A7630}" type="datetime1">
               <a:rPr lang="nl-NL" altLang="nl-NL" smtClean="0"/>
-              <a:t>30-5-2017</a:t>
+              <a:t>31-5-2017</a:t>
             </a:fld>
             <a:endParaRPr lang="nl-NL" altLang="nl-NL" dirty="0"/>
           </a:p>
@@ -2236,7 +2235,7 @@
               </a14:hiddenLine>
             </a:ext>
             <a:ext uri="{FAA26D3D-D897-4be2-8F04-BA451C77F1D7}">
-              <ma14:placeholderFlag xmlns="" xmlns:ma14="http://schemas.microsoft.com/office/mac/drawingml/2011/main" val="1"/>
+              <ma14:placeholderFlag xmlns:ma14="http://schemas.microsoft.com/office/mac/drawingml/2011/main" xmlns="" val="1"/>
             </a:ext>
           </a:extLst>
         </p:spPr>
@@ -2297,7 +2296,7 @@
               </a14:hiddenLine>
             </a:ext>
             <a:ext uri="{FAA26D3D-D897-4be2-8F04-BA451C77F1D7}">
-              <ma14:placeholderFlag xmlns="" xmlns:ma14="http://schemas.microsoft.com/office/mac/drawingml/2011/main" val="1"/>
+              <ma14:placeholderFlag xmlns:ma14="http://schemas.microsoft.com/office/mac/drawingml/2011/main" xmlns="" val="1"/>
             </a:ext>
           </a:extLst>
         </p:spPr>
@@ -2477,7 +2476,7 @@
             <a:fld id="{B3873A8C-A209-FC40-86BC-D3E9A671FD81}" type="datetime1">
               <a:rPr lang="nl-NL" altLang="nl-NL" smtClean="0"/>
               <a:pPr/>
-              <a:t>30-5-2017</a:t>
+              <a:t>31-5-2017</a:t>
             </a:fld>
             <a:endParaRPr lang="nl-NL" altLang="nl-NL" dirty="0"/>
           </a:p>
@@ -2975,7 +2974,7 @@
               </a14:hiddenLine>
             </a:ext>
             <a:ext uri="{FAA26D3D-D897-4be2-8F04-BA451C77F1D7}">
-              <ma14:placeholderFlag xmlns="" xmlns:ma14="http://schemas.microsoft.com/office/mac/drawingml/2011/main" val="1"/>
+              <ma14:placeholderFlag xmlns:ma14="http://schemas.microsoft.com/office/mac/drawingml/2011/main" xmlns="" val="1"/>
             </a:ext>
           </a:extLst>
         </p:spPr>
@@ -3036,7 +3035,7 @@
               </a14:hiddenLine>
             </a:ext>
             <a:ext uri="{FAA26D3D-D897-4be2-8F04-BA451C77F1D7}">
-              <ma14:placeholderFlag xmlns="" xmlns:ma14="http://schemas.microsoft.com/office/mac/drawingml/2011/main" val="1"/>
+              <ma14:placeholderFlag xmlns:ma14="http://schemas.microsoft.com/office/mac/drawingml/2011/main" xmlns="" val="1"/>
             </a:ext>
           </a:extLst>
         </p:spPr>
@@ -3217,7 +3216,7 @@
             <a:fld id="{FB5CF2AB-20FF-5442-9E53-3C6EDD7FBCEA}" type="datetime1">
               <a:rPr lang="nl-NL" altLang="nl-NL" smtClean="0"/>
               <a:pPr/>
-              <a:t>30-5-2017</a:t>
+              <a:t>31-5-2017</a:t>
             </a:fld>
             <a:endParaRPr lang="nl-NL" altLang="nl-NL" dirty="0"/>
           </a:p>
@@ -3760,14 +3759,6 @@
               </a:rPr>
               <a:t>https://www.kaggle.com/c/sberbank-russian-housing-market</a:t>
             </a:r>
-            <a:endParaRPr lang="nl-NL" dirty="0">
-              <a:solidFill>
-                <a:schemeClr val="accent1">
-                  <a:lumMod val="40000"/>
-                  <a:lumOff val="60000"/>
-                </a:schemeClr>
-              </a:solidFill>
-            </a:endParaRPr>
           </a:p>
         </p:txBody>
       </p:sp>
@@ -4005,11 +3996,7 @@
             </a:r>
             <a:r>
               <a:rPr lang="nl-NL" sz="3200" dirty="0" smtClean="0"/>
-              <a:t> element: differen</a:t>
-            </a:r>
-            <a:r>
-              <a:rPr lang="nl-NL" sz="3200" dirty="0" smtClean="0"/>
-              <a:t>t</a:t>
+              <a:t> element: different</a:t>
             </a:r>
             <a:r>
               <a:rPr lang="nl-NL" sz="3200" dirty="0" smtClean="0">
@@ -4093,62 +4080,11 @@
               <a:rPr lang="nl-NL" sz="3200" dirty="0" smtClean="0"/>
               <a:t> 	</a:t>
             </a:r>
-            <a:r>
-              <a:rPr lang="nl-NL" sz="3200" i="1" dirty="0" smtClean="0">
-                <a:solidFill>
-                  <a:srgbClr val="C00000"/>
-                </a:solidFill>
-              </a:rPr>
-              <a:t>But </a:t>
-            </a:r>
-            <a:r>
-              <a:rPr lang="nl-NL" sz="3200" i="1" dirty="0" err="1" smtClean="0">
-                <a:solidFill>
-                  <a:srgbClr val="C00000"/>
-                </a:solidFill>
-              </a:rPr>
-              <a:t>the</a:t>
-            </a:r>
-            <a:r>
-              <a:rPr lang="nl-NL" sz="3200" i="1" dirty="0" smtClean="0">
-                <a:solidFill>
-                  <a:srgbClr val="C00000"/>
-                </a:solidFill>
-              </a:rPr>
-              <a:t> test set is </a:t>
-            </a:r>
-            <a:r>
-              <a:rPr lang="nl-NL" sz="3200" i="1" dirty="0" err="1" smtClean="0">
-                <a:solidFill>
-                  <a:srgbClr val="C00000"/>
-                </a:solidFill>
-              </a:rPr>
-              <a:t>from</a:t>
-            </a:r>
-            <a:r>
-              <a:rPr lang="nl-NL" sz="3200" i="1" dirty="0" smtClean="0">
-                <a:solidFill>
-                  <a:srgbClr val="C00000"/>
-                </a:solidFill>
-              </a:rPr>
-              <a:t> 2015 </a:t>
-            </a:r>
-            <a:r>
-              <a:rPr lang="nl-NL" sz="3200" i="1" dirty="0" err="1" smtClean="0">
-                <a:solidFill>
-                  <a:srgbClr val="C00000"/>
-                </a:solidFill>
-              </a:rPr>
-              <a:t>to</a:t>
-            </a:r>
-            <a:r>
-              <a:rPr lang="nl-NL" sz="3200" i="1" dirty="0" smtClean="0">
-                <a:solidFill>
-                  <a:srgbClr val="C00000"/>
-                </a:solidFill>
-              </a:rPr>
-              <a:t> 2016!</a:t>
-            </a:r>
+            <a:endParaRPr lang="nl-NL" sz="3200" i="1" dirty="0" smtClean="0">
+              <a:solidFill>
+                <a:srgbClr val="C00000"/>
+              </a:solidFill>
+            </a:endParaRPr>
           </a:p>
           <a:p>
             <a:r>
@@ -4229,28 +4165,6 @@
                 </a:solidFill>
               </a:rPr>
               <a:t>Price. </a:t>
-            </a:r>
-          </a:p>
-          <a:p>
-            <a:r>
-              <a:rPr lang="nl-NL" sz="3200" dirty="0" smtClean="0"/>
-              <a:t>Large </a:t>
-            </a:r>
-            <a:r>
-              <a:rPr lang="nl-NL" sz="3200" dirty="0" err="1" smtClean="0"/>
-              <a:t>amount</a:t>
-            </a:r>
-            <a:r>
-              <a:rPr lang="nl-NL" sz="3200" dirty="0" smtClean="0"/>
-              <a:t> of features in data set </a:t>
-            </a:r>
-            <a:r>
-              <a:rPr lang="nl-NL" sz="3200" dirty="0" err="1" smtClean="0"/>
-              <a:t>already</a:t>
-            </a:r>
-            <a:r>
-              <a:rPr lang="nl-NL" sz="3200" dirty="0" smtClean="0"/>
-              <a:t> </a:t>
             </a:r>
           </a:p>
           <a:p>
@@ -4282,6 +4196,90 @@
           </a:prstGeom>
         </p:spPr>
       </p:pic>
+      <p:sp>
+        <p:nvSpPr>
+          <p:cNvPr id="3" name="TextBox 2"/>
+          <p:cNvSpPr txBox="1"/>
+          <p:nvPr/>
+        </p:nvSpPr>
+        <p:spPr>
+          <a:xfrm>
+            <a:off x="9168713" y="4094240"/>
+            <a:ext cx="7265773" cy="523220"/>
+          </a:xfrm>
+          <a:prstGeom prst="rect">
+            <a:avLst/>
+          </a:prstGeom>
+          <a:noFill/>
+        </p:spPr>
+        <p:txBody>
+          <a:bodyPr wrap="square" rtlCol="0">
+            <a:spAutoFit/>
+          </a:bodyPr>
+          <a:lstStyle/>
+          <a:p>
+            <a:r>
+              <a:rPr lang="nl-NL" sz="2800" i="1" dirty="0">
+                <a:solidFill>
+                  <a:srgbClr val="C00000"/>
+                </a:solidFill>
+              </a:rPr>
+              <a:t>But </a:t>
+            </a:r>
+            <a:r>
+              <a:rPr lang="nl-NL" sz="2800" i="1" dirty="0" err="1">
+                <a:solidFill>
+                  <a:srgbClr val="C00000"/>
+                </a:solidFill>
+              </a:rPr>
+              <a:t>the</a:t>
+            </a:r>
+            <a:r>
+              <a:rPr lang="nl-NL" sz="2800" i="1" dirty="0">
+                <a:solidFill>
+                  <a:srgbClr val="C00000"/>
+                </a:solidFill>
+              </a:rPr>
+              <a:t> test set is </a:t>
+            </a:r>
+            <a:r>
+              <a:rPr lang="nl-NL" sz="2800" i="1" dirty="0" err="1">
+                <a:solidFill>
+                  <a:srgbClr val="C00000"/>
+                </a:solidFill>
+              </a:rPr>
+              <a:t>from</a:t>
+            </a:r>
+            <a:r>
+              <a:rPr lang="nl-NL" sz="2800" i="1" dirty="0">
+                <a:solidFill>
+                  <a:srgbClr val="C00000"/>
+                </a:solidFill>
+              </a:rPr>
+              <a:t> 2015 </a:t>
+            </a:r>
+            <a:r>
+              <a:rPr lang="nl-NL" sz="2800" i="1" dirty="0" err="1">
+                <a:solidFill>
+                  <a:srgbClr val="C00000"/>
+                </a:solidFill>
+              </a:rPr>
+              <a:t>to</a:t>
+            </a:r>
+            <a:r>
+              <a:rPr lang="nl-NL" sz="2800" i="1" dirty="0">
+                <a:solidFill>
+                  <a:srgbClr val="C00000"/>
+                </a:solidFill>
+              </a:rPr>
+              <a:t> 2016!</a:t>
+            </a:r>
+            <a:endParaRPr lang="nl-NL" sz="2800" dirty="0" smtClean="0">
+              <a:latin typeface="+mn-lt"/>
+            </a:endParaRPr>
+          </a:p>
+        </p:txBody>
+      </p:sp>
     </p:spTree>
     <p:extLst>
       <p:ext uri="{BB962C8B-B14F-4D97-AF65-F5344CB8AC3E}">
@@ -4298,7 +4296,369 @@
   <p:timing>
     <p:tnLst>
       <p:par>
-        <p:cTn id="1" dur="indefinite" restart="never" nodeType="tmRoot"/>
+        <p:cTn id="1" dur="indefinite" restart="never" nodeType="tmRoot">
+          <p:childTnLst>
+            <p:seq concurrent="1" nextAc="seek">
+              <p:cTn id="2" dur="indefinite" nodeType="mainSeq">
+                <p:childTnLst>
+                  <p:par>
+                    <p:cTn id="3" fill="hold">
+                      <p:stCondLst>
+                        <p:cond delay="indefinite"/>
+                      </p:stCondLst>
+                      <p:childTnLst>
+                        <p:par>
+                          <p:cTn id="4" fill="hold">
+                            <p:stCondLst>
+                              <p:cond delay="0"/>
+                            </p:stCondLst>
+                            <p:childTnLst>
+                              <p:par>
+                                <p:cTn id="5" presetID="1" presetClass="entr" presetSubtype="0" fill="hold" nodeType="clickEffect">
+                                  <p:stCondLst>
+                                    <p:cond delay="0"/>
+                                  </p:stCondLst>
+                                  <p:childTnLst>
+                                    <p:set>
+                                      <p:cBhvr>
+                                        <p:cTn id="6" dur="1" fill="hold">
+                                          <p:stCondLst>
+                                            <p:cond delay="0"/>
+                                          </p:stCondLst>
+                                        </p:cTn>
+                                        <p:tgtEl>
+                                          <p:spTgt spid="5">
+                                            <p:txEl>
+                                              <p:pRg st="1" end="1"/>
+                                            </p:txEl>
+                                          </p:spTgt>
+                                        </p:tgtEl>
+                                        <p:attrNameLst>
+                                          <p:attrName>style.visibility</p:attrName>
+                                        </p:attrNameLst>
+                                      </p:cBhvr>
+                                      <p:to>
+                                        <p:strVal val="visible"/>
+                                      </p:to>
+                                    </p:set>
+                                  </p:childTnLst>
+                                </p:cTn>
+                              </p:par>
+                            </p:childTnLst>
+                          </p:cTn>
+                        </p:par>
+                      </p:childTnLst>
+                    </p:cTn>
+                  </p:par>
+                  <p:par>
+                    <p:cTn id="7" fill="hold">
+                      <p:stCondLst>
+                        <p:cond delay="indefinite"/>
+                      </p:stCondLst>
+                      <p:childTnLst>
+                        <p:par>
+                          <p:cTn id="8" fill="hold">
+                            <p:stCondLst>
+                              <p:cond delay="0"/>
+                            </p:stCondLst>
+                            <p:childTnLst>
+                              <p:par>
+                                <p:cTn id="9" presetID="1" presetClass="entr" presetSubtype="0" fill="hold" nodeType="clickEffect">
+                                  <p:stCondLst>
+                                    <p:cond delay="0"/>
+                                  </p:stCondLst>
+                                  <p:childTnLst>
+                                    <p:set>
+                                      <p:cBhvr>
+                                        <p:cTn id="10" dur="1" fill="hold">
+                                          <p:stCondLst>
+                                            <p:cond delay="0"/>
+                                          </p:stCondLst>
+                                        </p:cTn>
+                                        <p:tgtEl>
+                                          <p:spTgt spid="5">
+                                            <p:txEl>
+                                              <p:pRg st="2" end="2"/>
+                                            </p:txEl>
+                                          </p:spTgt>
+                                        </p:tgtEl>
+                                        <p:attrNameLst>
+                                          <p:attrName>style.visibility</p:attrName>
+                                        </p:attrNameLst>
+                                      </p:cBhvr>
+                                      <p:to>
+                                        <p:strVal val="visible"/>
+                                      </p:to>
+                                    </p:set>
+                                  </p:childTnLst>
+                                </p:cTn>
+                              </p:par>
+                            </p:childTnLst>
+                          </p:cTn>
+                        </p:par>
+                      </p:childTnLst>
+                    </p:cTn>
+                  </p:par>
+                  <p:par>
+                    <p:cTn id="11" fill="hold">
+                      <p:stCondLst>
+                        <p:cond delay="indefinite"/>
+                      </p:stCondLst>
+                      <p:childTnLst>
+                        <p:par>
+                          <p:cTn id="12" fill="hold">
+                            <p:stCondLst>
+                              <p:cond delay="0"/>
+                            </p:stCondLst>
+                            <p:childTnLst>
+                              <p:par>
+                                <p:cTn id="13" presetID="1" presetClass="entr" presetSubtype="0" fill="hold" nodeType="clickEffect">
+                                  <p:stCondLst>
+                                    <p:cond delay="0"/>
+                                  </p:stCondLst>
+                                  <p:childTnLst>
+                                    <p:set>
+                                      <p:cBhvr>
+                                        <p:cTn id="14" dur="1" fill="hold">
+                                          <p:stCondLst>
+                                            <p:cond delay="0"/>
+                                          </p:stCondLst>
+                                        </p:cTn>
+                                        <p:tgtEl>
+                                          <p:spTgt spid="2"/>
+                                        </p:tgtEl>
+                                        <p:attrNameLst>
+                                          <p:attrName>style.visibility</p:attrName>
+                                        </p:attrNameLst>
+                                      </p:cBhvr>
+                                      <p:to>
+                                        <p:strVal val="visible"/>
+                                      </p:to>
+                                    </p:set>
+                                  </p:childTnLst>
+                                </p:cTn>
+                              </p:par>
+                            </p:childTnLst>
+                          </p:cTn>
+                        </p:par>
+                      </p:childTnLst>
+                    </p:cTn>
+                  </p:par>
+                  <p:par>
+                    <p:cTn id="15" fill="hold">
+                      <p:stCondLst>
+                        <p:cond delay="indefinite"/>
+                      </p:stCondLst>
+                      <p:childTnLst>
+                        <p:par>
+                          <p:cTn id="16" fill="hold">
+                            <p:stCondLst>
+                              <p:cond delay="0"/>
+                            </p:stCondLst>
+                            <p:childTnLst>
+                              <p:par>
+                                <p:cTn id="17" presetID="1" presetClass="entr" presetSubtype="0" fill="hold" nodeType="clickEffect">
+                                  <p:stCondLst>
+                                    <p:cond delay="0"/>
+                                  </p:stCondLst>
+                                  <p:childTnLst>
+                                    <p:set>
+                                      <p:cBhvr>
+                                        <p:cTn id="18" dur="1" fill="hold">
+                                          <p:stCondLst>
+                                            <p:cond delay="0"/>
+                                          </p:stCondLst>
+                                        </p:cTn>
+                                        <p:tgtEl>
+                                          <p:spTgt spid="5">
+                                            <p:txEl>
+                                              <p:pRg st="3" end="3"/>
+                                            </p:txEl>
+                                          </p:spTgt>
+                                        </p:tgtEl>
+                                        <p:attrNameLst>
+                                          <p:attrName>style.visibility</p:attrName>
+                                        </p:attrNameLst>
+                                      </p:cBhvr>
+                                      <p:to>
+                                        <p:strVal val="visible"/>
+                                      </p:to>
+                                    </p:set>
+                                  </p:childTnLst>
+                                </p:cTn>
+                              </p:par>
+                            </p:childTnLst>
+                          </p:cTn>
+                        </p:par>
+                      </p:childTnLst>
+                    </p:cTn>
+                  </p:par>
+                  <p:par>
+                    <p:cTn id="19" fill="hold">
+                      <p:stCondLst>
+                        <p:cond delay="indefinite"/>
+                      </p:stCondLst>
+                      <p:childTnLst>
+                        <p:par>
+                          <p:cTn id="20" fill="hold">
+                            <p:stCondLst>
+                              <p:cond delay="0"/>
+                            </p:stCondLst>
+                            <p:childTnLst>
+                              <p:par>
+                                <p:cTn id="21" presetID="1" presetClass="entr" presetSubtype="0" fill="hold" nodeType="clickEffect">
+                                  <p:stCondLst>
+                                    <p:cond delay="0"/>
+                                  </p:stCondLst>
+                                  <p:childTnLst>
+                                    <p:set>
+                                      <p:cBhvr>
+                                        <p:cTn id="22" dur="1" fill="hold">
+                                          <p:stCondLst>
+                                            <p:cond delay="0"/>
+                                          </p:stCondLst>
+                                        </p:cTn>
+                                        <p:tgtEl>
+                                          <p:spTgt spid="3">
+                                            <p:txEl>
+                                              <p:pRg st="0" end="0"/>
+                                            </p:txEl>
+                                          </p:spTgt>
+                                        </p:tgtEl>
+                                        <p:attrNameLst>
+                                          <p:attrName>style.visibility</p:attrName>
+                                        </p:attrNameLst>
+                                      </p:cBhvr>
+                                      <p:to>
+                                        <p:strVal val="visible"/>
+                                      </p:to>
+                                    </p:set>
+                                  </p:childTnLst>
+                                </p:cTn>
+                              </p:par>
+                            </p:childTnLst>
+                          </p:cTn>
+                        </p:par>
+                      </p:childTnLst>
+                    </p:cTn>
+                  </p:par>
+                  <p:par>
+                    <p:cTn id="23" fill="hold">
+                      <p:stCondLst>
+                        <p:cond delay="indefinite"/>
+                      </p:stCondLst>
+                      <p:childTnLst>
+                        <p:par>
+                          <p:cTn id="24" fill="hold">
+                            <p:stCondLst>
+                              <p:cond delay="0"/>
+                            </p:stCondLst>
+                            <p:childTnLst>
+                              <p:par>
+                                <p:cTn id="25" presetID="1" presetClass="entr" presetSubtype="0" fill="hold" nodeType="clickEffect">
+                                  <p:stCondLst>
+                                    <p:cond delay="0"/>
+                                  </p:stCondLst>
+                                  <p:childTnLst>
+                                    <p:set>
+                                      <p:cBhvr>
+                                        <p:cTn id="26" dur="1" fill="hold">
+                                          <p:stCondLst>
+                                            <p:cond delay="0"/>
+                                          </p:stCondLst>
+                                        </p:cTn>
+                                        <p:tgtEl>
+                                          <p:spTgt spid="5">
+                                            <p:txEl>
+                                              <p:pRg st="4" end="4"/>
+                                            </p:txEl>
+                                          </p:spTgt>
+                                        </p:tgtEl>
+                                        <p:attrNameLst>
+                                          <p:attrName>style.visibility</p:attrName>
+                                        </p:attrNameLst>
+                                      </p:cBhvr>
+                                      <p:to>
+                                        <p:strVal val="visible"/>
+                                      </p:to>
+                                    </p:set>
+                                  </p:childTnLst>
+                                </p:cTn>
+                              </p:par>
+                            </p:childTnLst>
+                          </p:cTn>
+                        </p:par>
+                      </p:childTnLst>
+                    </p:cTn>
+                  </p:par>
+                  <p:par>
+                    <p:cTn id="27" fill="hold">
+                      <p:stCondLst>
+                        <p:cond delay="indefinite"/>
+                      </p:stCondLst>
+                      <p:childTnLst>
+                        <p:par>
+                          <p:cTn id="28" fill="hold">
+                            <p:stCondLst>
+                              <p:cond delay="0"/>
+                            </p:stCondLst>
+                            <p:childTnLst>
+                              <p:par>
+                                <p:cTn id="29" presetID="1" presetClass="entr" presetSubtype="0" fill="hold" nodeType="clickEffect">
+                                  <p:stCondLst>
+                                    <p:cond delay="0"/>
+                                  </p:stCondLst>
+                                  <p:childTnLst>
+                                    <p:set>
+                                      <p:cBhvr>
+                                        <p:cTn id="30" dur="1" fill="hold">
+                                          <p:stCondLst>
+                                            <p:cond delay="0"/>
+                                          </p:stCondLst>
+                                        </p:cTn>
+                                        <p:tgtEl>
+                                          <p:spTgt spid="5">
+                                            <p:txEl>
+                                              <p:pRg st="5" end="5"/>
+                                            </p:txEl>
+                                          </p:spTgt>
+                                        </p:tgtEl>
+                                        <p:attrNameLst>
+                                          <p:attrName>style.visibility</p:attrName>
+                                        </p:attrNameLst>
+                                      </p:cBhvr>
+                                      <p:to>
+                                        <p:strVal val="visible"/>
+                                      </p:to>
+                                    </p:set>
+                                  </p:childTnLst>
+                                </p:cTn>
+                              </p:par>
+                            </p:childTnLst>
+                          </p:cTn>
+                        </p:par>
+                      </p:childTnLst>
+                    </p:cTn>
+                  </p:par>
+                </p:childTnLst>
+              </p:cTn>
+              <p:prevCondLst>
+                <p:cond evt="onPrev" delay="0">
+                  <p:tgtEl>
+                    <p:sldTgt/>
+                  </p:tgtEl>
+                </p:cond>
+              </p:prevCondLst>
+              <p:nextCondLst>
+                <p:cond evt="onNext" delay="0">
+                  <p:tgtEl>
+                    <p:sldTgt/>
+                  </p:tgtEl>
+                </p:cond>
+              </p:nextCondLst>
+            </p:seq>
+          </p:childTnLst>
+        </p:cTn>
       </p:par>
     </p:tnLst>
   </p:timing>
@@ -4339,23 +4699,19 @@
           <a:p>
             <a:r>
               <a:rPr lang="nl-NL" dirty="0" smtClean="0"/>
-              <a:t>Iets over data </a:t>
+              <a:t>Step </a:t>
             </a:r>
             <a:r>
               <a:rPr lang="nl-NL" dirty="0" err="1" smtClean="0"/>
-              <a:t>explo</a:t>
+              <a:t>One</a:t>
             </a:r>
             <a:r>
               <a:rPr lang="nl-NL" dirty="0" smtClean="0"/>
-              <a:t> (mijn stuff, Jordi, </a:t>
-            </a:r>
-            <a:r>
-              <a:rPr lang="nl-NL" dirty="0" err="1" smtClean="0"/>
-              <a:t>thijs</a:t>
+              <a:t>: Data Exp</a:t>
             </a:r>
             <a:r>
               <a:rPr lang="nl-NL" dirty="0" smtClean="0"/>
-              <a:t>?)</a:t>
+              <a:t>loration</a:t>
             </a:r>
             <a:endParaRPr lang="nl-NL" dirty="0"/>
           </a:p>
@@ -4376,7 +4732,105 @@
           <a:bodyPr/>
           <a:lstStyle/>
           <a:p>
-            <a:endParaRPr lang="nl-NL" dirty="0"/>
+            <a:r>
+              <a:rPr lang="nl-NL" dirty="0" smtClean="0"/>
+              <a:t> </a:t>
+            </a:r>
+            <a:r>
+              <a:rPr lang="nl-NL" dirty="0" smtClean="0">
+                <a:solidFill>
+                  <a:srgbClr val="B72922"/>
+                </a:solidFill>
+              </a:rPr>
+              <a:t>30471</a:t>
+            </a:r>
+            <a:r>
+              <a:rPr lang="nl-NL" dirty="0" smtClean="0"/>
+              <a:t> </a:t>
+            </a:r>
+            <a:r>
+              <a:rPr lang="nl-NL" dirty="0" err="1"/>
+              <a:t>objects</a:t>
+            </a:r>
+            <a:r>
+              <a:rPr lang="nl-NL" dirty="0"/>
+              <a:t> </a:t>
+            </a:r>
+            <a:r>
+              <a:rPr lang="nl-NL" dirty="0" err="1"/>
+              <a:t>with</a:t>
+            </a:r>
+            <a:r>
+              <a:rPr lang="nl-NL" dirty="0"/>
+              <a:t> </a:t>
+            </a:r>
+            <a:r>
+              <a:rPr lang="nl-NL" dirty="0">
+                <a:solidFill>
+                  <a:srgbClr val="B72922"/>
+                </a:solidFill>
+              </a:rPr>
+              <a:t>291</a:t>
+            </a:r>
+            <a:r>
+              <a:rPr lang="nl-NL" dirty="0"/>
+              <a:t> features </a:t>
+            </a:r>
+            <a:r>
+              <a:rPr lang="nl-NL" dirty="0" err="1"/>
+              <a:t>from</a:t>
+            </a:r>
+            <a:r>
+              <a:rPr lang="nl-NL" dirty="0"/>
+              <a:t> </a:t>
+            </a:r>
+            <a:r>
+              <a:rPr lang="nl-NL" dirty="0">
+                <a:solidFill>
+                  <a:srgbClr val="B72922"/>
+                </a:solidFill>
+              </a:rPr>
+              <a:t>146</a:t>
+            </a:r>
+            <a:r>
+              <a:rPr lang="nl-NL" dirty="0"/>
+              <a:t> </a:t>
+            </a:r>
+            <a:r>
+              <a:rPr lang="nl-NL" dirty="0" err="1" smtClean="0"/>
+              <a:t>districts</a:t>
+            </a:r>
+            <a:endParaRPr lang="nl-NL" dirty="0" smtClean="0"/>
+          </a:p>
+          <a:p>
+            <a:r>
+              <a:rPr lang="nl-NL" dirty="0" smtClean="0"/>
+              <a:t> </a:t>
+            </a:r>
+            <a:r>
+              <a:rPr lang="nl-NL" dirty="0" err="1" smtClean="0"/>
+              <a:t>Exploratory</a:t>
+            </a:r>
+            <a:r>
+              <a:rPr lang="nl-NL" dirty="0" smtClean="0"/>
+              <a:t> </a:t>
+            </a:r>
+            <a:r>
+              <a:rPr lang="nl-NL" dirty="0" err="1" smtClean="0"/>
+              <a:t>work</a:t>
+            </a:r>
+            <a:r>
+              <a:rPr lang="nl-NL" dirty="0" smtClean="0"/>
+              <a:t>: Python / Apache </a:t>
+            </a:r>
+            <a:r>
+              <a:rPr lang="nl-NL" dirty="0" err="1" smtClean="0"/>
+              <a:t>Spark</a:t>
+            </a:r>
+            <a:r>
+              <a:rPr lang="nl-NL" dirty="0" smtClean="0"/>
+              <a:t> / Leaflet.js</a:t>
+            </a:r>
           </a:p>
         </p:txBody>
       </p:sp>
@@ -4396,7 +4850,128 @@
   <p:timing>
     <p:tnLst>
       <p:par>
-        <p:cTn id="1" dur="indefinite" restart="never" nodeType="tmRoot"/>
+        <p:cTn id="1" dur="indefinite" restart="never" nodeType="tmRoot">
+          <p:childTnLst>
+            <p:seq concurrent="1" nextAc="seek">
+              <p:cTn id="2" dur="indefinite" nodeType="mainSeq">
+                <p:childTnLst>
+                  <p:par>
+                    <p:cTn id="3" fill="hold">
+                      <p:stCondLst>
+                        <p:cond delay="indefinite"/>
+                      </p:stCondLst>
+                      <p:childTnLst>
+                        <p:par>
+                          <p:cTn id="4" fill="hold">
+                            <p:stCondLst>
+                              <p:cond delay="0"/>
+                            </p:stCondLst>
+                            <p:childTnLst>
+                              <p:par>
+                                <p:cTn id="5" presetID="1" presetClass="entr" presetSubtype="0" fill="hold" nodeType="clickEffect">
+                                  <p:stCondLst>
+                                    <p:cond delay="0"/>
+                                  </p:stCondLst>
+                                  <p:childTnLst>
+                                    <p:set>
+                                      <p:cBhvr>
+                                        <p:cTn id="6" dur="1" fill="hold">
+                                          <p:stCondLst>
+                                            <p:cond delay="0"/>
+                                          </p:stCondLst>
+                                        </p:cTn>
+                                        <p:tgtEl>
+                                          <p:spTgt spid="5">
+                                            <p:txEl>
+                                              <p:pRg st="0" end="0"/>
+                                            </p:txEl>
+                                          </p:spTgt>
+                                        </p:tgtEl>
+                                        <p:attrNameLst>
+                                          <p:attrName>style.visibility</p:attrName>
+                                        </p:attrNameLst>
+                                      </p:cBhvr>
+                                      <p:to>
+                                        <p:strVal val="visible"/>
+                                      </p:to>
+                                    </p:set>
+                                  </p:childTnLst>
+                                </p:cTn>
+                              </p:par>
+                            </p:childTnLst>
+                          </p:cTn>
+                        </p:par>
+                      </p:childTnLst>
+                    </p:cTn>
+                  </p:par>
+                  <p:par>
+                    <p:cTn id="7" fill="hold">
+                      <p:stCondLst>
+                        <p:cond delay="indefinite"/>
+                      </p:stCondLst>
+                      <p:childTnLst>
+                        <p:par>
+                          <p:cTn id="8" fill="hold">
+                            <p:stCondLst>
+                              <p:cond delay="0"/>
+                            </p:stCondLst>
+                            <p:childTnLst>
+                              <p:par>
+                                <p:cTn id="9" presetID="1" presetClass="entr" presetSubtype="0" fill="hold" nodeType="clickEffect">
+                                  <p:stCondLst>
+                                    <p:cond delay="0"/>
+                                  </p:stCondLst>
+                                  <p:childTnLst>
+                                    <p:set>
+                                      <p:cBhvr>
+                                        <p:cTn id="10" dur="1" fill="hold">
+                                          <p:stCondLst>
+                                            <p:cond delay="0"/>
+                                          </p:stCondLst>
+                                        </p:cTn>
+                                        <p:tgtEl>
+                                          <p:spTgt spid="5">
+                                            <p:txEl>
+                                              <p:pRg st="1" end="1"/>
+                                            </p:txEl>
+                                          </p:spTgt>
+                                        </p:tgtEl>
+                                        <p:attrNameLst>
+                                          <p:attrName>style.visibility</p:attrName>
+                                        </p:attrNameLst>
+                                      </p:cBhvr>
+                                      <p:to>
+                                        <p:strVal val="visible"/>
+                                      </p:to>
+                                    </p:set>
+                                  </p:childTnLst>
+                                </p:cTn>
+                              </p:par>
+                            </p:childTnLst>
+                          </p:cTn>
+                        </p:par>
+                      </p:childTnLst>
+                    </p:cTn>
+                  </p:par>
+                </p:childTnLst>
+              </p:cTn>
+              <p:prevCondLst>
+                <p:cond evt="onPrev" delay="0">
+                  <p:tgtEl>
+                    <p:sldTgt/>
+                  </p:tgtEl>
+                </p:cond>
+              </p:prevCondLst>
+              <p:nextCondLst>
+                <p:cond evt="onNext" delay="0">
+                  <p:tgtEl>
+                    <p:sldTgt/>
+                  </p:tgtEl>
+                </p:cond>
+              </p:nextCondLst>
+            </p:seq>
+          </p:childTnLst>
+        </p:cTn>
       </p:par>
     </p:tnLst>
   </p:timing>
@@ -4459,76 +5034,50 @@
           <a:lstStyle/>
           <a:p>
             <a:r>
-              <a:rPr lang="nl-NL" dirty="0" smtClean="0"/>
+              <a:rPr lang="en-US" dirty="0" smtClean="0"/>
               <a:t>Missing data:  </a:t>
             </a:r>
             <a:r>
-              <a:rPr lang="nl-NL" dirty="0" err="1" smtClean="0"/>
-              <a:t>what</a:t>
-            </a:r>
-            <a:r>
-              <a:rPr lang="nl-NL" dirty="0" smtClean="0"/>
-              <a:t> </a:t>
-            </a:r>
-            <a:r>
-              <a:rPr lang="nl-NL" dirty="0" err="1" smtClean="0"/>
-              <a:t>can</a:t>
-            </a:r>
-            <a:r>
-              <a:rPr lang="nl-NL" dirty="0" smtClean="0"/>
-              <a:t> we do?</a:t>
-            </a:r>
-          </a:p>
-          <a:p>
-            <a:r>
-              <a:rPr lang="nl-NL" dirty="0" err="1" smtClean="0"/>
-              <a:t>Implementing</a:t>
-            </a:r>
-            <a:r>
-              <a:rPr lang="nl-NL" dirty="0" smtClean="0"/>
-              <a:t> basic </a:t>
-            </a:r>
-            <a:r>
-              <a:rPr lang="nl-NL" dirty="0" err="1" smtClean="0"/>
-              <a:t>methods</a:t>
-            </a:r>
-            <a:r>
-              <a:rPr lang="nl-NL" dirty="0" smtClean="0"/>
-              <a:t> </a:t>
-            </a:r>
-            <a:r>
-              <a:rPr lang="nl-NL" dirty="0" err="1" smtClean="0"/>
-              <a:t>to</a:t>
-            </a:r>
-            <a:r>
-              <a:rPr lang="nl-NL" dirty="0" smtClean="0"/>
-              <a:t> </a:t>
-            </a:r>
-            <a:r>
-              <a:rPr lang="nl-NL" dirty="0" err="1" smtClean="0"/>
-              <a:t>see</a:t>
-            </a:r>
-            <a:r>
-              <a:rPr lang="nl-NL" dirty="0" smtClean="0"/>
-              <a:t> </a:t>
-            </a:r>
-            <a:r>
-              <a:rPr lang="nl-NL" dirty="0" err="1" smtClean="0"/>
-              <a:t>what</a:t>
-            </a:r>
-            <a:r>
-              <a:rPr lang="nl-NL" dirty="0" smtClean="0"/>
-              <a:t> we get: </a:t>
-            </a:r>
-            <a:r>
-              <a:rPr lang="nl-NL" dirty="0" err="1" smtClean="0">
+              <a:rPr lang="en-US" dirty="0" smtClean="0"/>
+              <a:t>replacing with representative values, pruning, with respect to the data</a:t>
+            </a:r>
+            <a:endParaRPr lang="en-US" dirty="0" smtClean="0"/>
+          </a:p>
+          <a:p>
+            <a:r>
+              <a:rPr lang="en-US" dirty="0" smtClean="0"/>
+              <a:t>Implementing some </a:t>
+            </a:r>
+            <a:r>
+              <a:rPr lang="en-US" dirty="0" smtClean="0"/>
+              <a:t>go-to tools </a:t>
+            </a:r>
+            <a:r>
+              <a:rPr lang="en-US" dirty="0" smtClean="0"/>
+              <a:t>to see what we get: </a:t>
+            </a:r>
+            <a:r>
+              <a:rPr lang="en-US" dirty="0" err="1" smtClean="0">
                 <a:solidFill>
                   <a:srgbClr val="B72922"/>
                 </a:solidFill>
               </a:rPr>
               <a:t>XGBoost</a:t>
             </a:r>
-            <a:endParaRPr lang="nl-NL" dirty="0">
+            <a:r>
+              <a:rPr lang="en-US" dirty="0" smtClean="0">
+                <a:solidFill>
+                  <a:srgbClr val="B72922"/>
+                </a:solidFill>
+              </a:rPr>
+              <a:t> </a:t>
+            </a:r>
+          </a:p>
+          <a:p>
+            <a:pPr marL="0" indent="0">
+              <a:buNone/>
+            </a:pPr>
+            <a:endParaRPr lang="en-US" dirty="0" smtClean="0">
               <a:solidFill>
                 <a:srgbClr val="B72922"/>
               </a:solidFill>
@@ -4561,7 +5110,128 @@
   <p:timing>
     <p:tnLst>
       <p:par>
-        <p:cTn id="1" dur="indefinite" restart="never" nodeType="tmRoot"/>
+        <p:cTn id="1" dur="indefinite" restart="never" nodeType="tmRoot">
+          <p:childTnLst>
+            <p:seq concurrent="1" nextAc="seek">
+              <p:cTn id="2" dur="indefinite" nodeType="mainSeq">
+                <p:childTnLst>
+                  <p:par>
+                    <p:cTn id="3" fill="hold">
+                      <p:stCondLst>
+                        <p:cond delay="indefinite"/>
+                      </p:stCondLst>
+                      <p:childTnLst>
+                        <p:par>
+                          <p:cTn id="4" fill="hold">
+                            <p:stCondLst>
+                              <p:cond delay="0"/>
+                            </p:stCondLst>
+                            <p:childTnLst>
+                              <p:par>
+                                <p:cTn id="5" presetID="1" presetClass="entr" presetSubtype="0" fill="hold" nodeType="clickEffect">
+                                  <p:stCondLst>
+                                    <p:cond delay="0"/>
+                                  </p:stCondLst>
+                                  <p:childTnLst>
+                                    <p:set>
+                                      <p:cBhvr>
+                                        <p:cTn id="6" dur="1" fill="hold">
+                                          <p:stCondLst>
+                                            <p:cond delay="0"/>
+                                          </p:stCondLst>
+                                        </p:cTn>
+                                        <p:tgtEl>
+                                          <p:spTgt spid="5">
+                                            <p:txEl>
+                                              <p:pRg st="0" end="0"/>
+                                            </p:txEl>
+                                          </p:spTgt>
+                                        </p:tgtEl>
+                                        <p:attrNameLst>
+                                          <p:attrName>style.visibility</p:attrName>
+                                        </p:attrNameLst>
+                                      </p:cBhvr>
+                                      <p:to>
+                                        <p:strVal val="visible"/>
+                                      </p:to>
+                                    </p:set>
+                                  </p:childTnLst>
+                                </p:cTn>
+                              </p:par>
+                            </p:childTnLst>
+                          </p:cTn>
+                        </p:par>
+                      </p:childTnLst>
+                    </p:cTn>
+                  </p:par>
+                  <p:par>
+                    <p:cTn id="7" fill="hold">
+                      <p:stCondLst>
+                        <p:cond delay="indefinite"/>
+                      </p:stCondLst>
+                      <p:childTnLst>
+                        <p:par>
+                          <p:cTn id="8" fill="hold">
+                            <p:stCondLst>
+                              <p:cond delay="0"/>
+                            </p:stCondLst>
+                            <p:childTnLst>
+                              <p:par>
+                                <p:cTn id="9" presetID="1" presetClass="entr" presetSubtype="0" fill="hold" nodeType="clickEffect">
+                                  <p:stCondLst>
+                                    <p:cond delay="0"/>
+                                  </p:stCondLst>
+                                  <p:childTnLst>
+                                    <p:set>
+                                      <p:cBhvr>
+                                        <p:cTn id="10" dur="1" fill="hold">
+                                          <p:stCondLst>
+                                            <p:cond delay="0"/>
+                                          </p:stCondLst>
+                                        </p:cTn>
+                                        <p:tgtEl>
+                                          <p:spTgt spid="5">
+                                            <p:txEl>
+                                              <p:pRg st="1" end="1"/>
+                                            </p:txEl>
+                                          </p:spTgt>
+                                        </p:tgtEl>
+                                        <p:attrNameLst>
+                                          <p:attrName>style.visibility</p:attrName>
+                                        </p:attrNameLst>
+                                      </p:cBhvr>
+                                      <p:to>
+                                        <p:strVal val="visible"/>
+                                      </p:to>
+                                    </p:set>
+                                  </p:childTnLst>
+                                </p:cTn>
+                              </p:par>
+                            </p:childTnLst>
+                          </p:cTn>
+                        </p:par>
+                      </p:childTnLst>
+                    </p:cTn>
+                  </p:par>
+                </p:childTnLst>
+              </p:cTn>
+              <p:prevCondLst>
+                <p:cond evt="onPrev" delay="0">
+                  <p:tgtEl>
+                    <p:sldTgt/>
+                  </p:tgtEl>
+                </p:cond>
+              </p:prevCondLst>
+              <p:nextCondLst>
+                <p:cond evt="onNext" delay="0">
+                  <p:tgtEl>
+                    <p:sldTgt/>
+                  </p:tgtEl>
+                </p:cond>
+              </p:nextCondLst>
+            </p:seq>
+          </p:childTnLst>
+        </p:cTn>
       </p:par>
     </p:tnLst>
   </p:timing>
@@ -4618,30 +5288,53 @@
             <p:ph idx="1"/>
           </p:nvPr>
         </p:nvSpPr>
-        <p:spPr/>
+        <p:spPr>
+          <a:xfrm>
+            <a:off x="2842495" y="2736775"/>
+            <a:ext cx="14889083" cy="7020000"/>
+          </a:xfrm>
+        </p:spPr>
         <p:txBody>
           <a:bodyPr/>
           <a:lstStyle/>
           <a:p>
+            <a:pPr marL="0" indent="0">
+              <a:buNone/>
+            </a:pPr>
+            <a:r>
+              <a:rPr lang="nl-NL" dirty="0" smtClean="0"/>
+              <a:t>					</a:t>
+            </a:r>
             <a:r>
               <a:rPr lang="nl-NL" dirty="0" err="1" smtClean="0"/>
               <a:t>Current</a:t>
             </a:r>
             <a:r>
               <a:rPr lang="nl-NL" dirty="0" smtClean="0"/>
-              <a:t> rank:</a:t>
-            </a:r>
-          </a:p>
-          <a:p>
+              <a:t> rank</a:t>
+            </a:r>
             <a:r>
               <a:rPr lang="nl-NL" dirty="0" smtClean="0"/>
-              <a:t>.. Per mode</a:t>
-            </a:r>
-            <a:r>
-              <a:rPr lang="nl-NL" dirty="0"/>
-              <a:t>l</a:t>
-            </a:r>
-            <a:endParaRPr lang="nl-NL" dirty="0" smtClean="0"/>
+              <a:t>: </a:t>
+            </a:r>
+          </a:p>
+          <a:p>
+            <a:pPr marL="1219901" lvl="2" indent="0">
+              <a:buNone/>
+            </a:pPr>
+            <a:r>
+              <a:rPr lang="nl-NL" sz="4800" dirty="0" smtClean="0">
+                <a:solidFill>
+                  <a:srgbClr val="B72922"/>
+                </a:solidFill>
+              </a:rPr>
+              <a:t>			~720 of ~2400</a:t>
+            </a:r>
+            <a:endParaRPr lang="nl-NL" sz="4800" dirty="0" smtClean="0">
+              <a:solidFill>
+                <a:srgbClr val="B72922"/>
+              </a:solidFill>
+            </a:endParaRPr>
           </a:p>
         </p:txBody>
       </p:sp>
@@ -4661,7 +5354,110 @@
   <p:timing>
     <p:tnLst>
       <p:par>
-        <p:cTn id="1" dur="indefinite" restart="never" nodeType="tmRoot"/>
+        <p:cTn id="1" dur="indefinite" restart="never" nodeType="tmRoot">
+          <p:childTnLst>
+            <p:seq concurrent="1" nextAc="seek">
+              <p:cTn id="2" dur="indefinite" nodeType="mainSeq">
+                <p:childTnLst>
+                  <p:par>
+                    <p:cTn id="3" fill="hold">
+                      <p:stCondLst>
+                        <p:cond delay="indefinite"/>
+                      </p:stCondLst>
+                      <p:childTnLst>
+                        <p:par>
+                          <p:cTn id="4" fill="hold">
+                            <p:stCondLst>
+                              <p:cond delay="0"/>
+                            </p:stCondLst>
+                            <p:childTnLst>
+                              <p:par>
+                                <p:cTn id="5" presetID="1" presetClass="entr" presetSubtype="0" fill="hold" nodeType="clickEffect">
+                                  <p:stCondLst>
+                                    <p:cond delay="0"/>
+                                  </p:stCondLst>
+                                  <p:childTnLst>
+                                    <p:set>
+                                      <p:cBhvr>
+                                        <p:cTn id="6" dur="1" fill="hold">
+                                          <p:stCondLst>
+                                            <p:cond delay="0"/>
+                                          </p:stCondLst>
+                                        </p:cTn>
+                                        <p:tgtEl>
+                                          <p:spTgt spid="5">
+                                            <p:txEl>
+                                              <p:pRg st="0" end="0"/>
+                                            </p:txEl>
+                                          </p:spTgt>
+                                        </p:tgtEl>
+                                        <p:attrNameLst>
+                                          <p:attrName>style.visibility</p:attrName>
+                                        </p:attrNameLst>
+                                      </p:cBhvr>
+                                      <p:to>
+                                        <p:strVal val="visible"/>
+                                      </p:to>
+                                    </p:set>
+                                  </p:childTnLst>
+                                </p:cTn>
+                              </p:par>
+                              <p:par>
+                                <p:cTn id="7" presetID="1" presetClass="entr" presetSubtype="0" fill="hold" nodeType="withEffect">
+                                  <p:stCondLst>
+                                    <p:cond delay="0"/>
+                                  </p:stCondLst>
+                                  <p:childTnLst>
+                                    <p:set>
+                                      <p:cBhvr>
+                                        <p:cTn id="8" dur="1" fill="hold">
+                                          <p:stCondLst>
+                                            <p:cond delay="0"/>
+                                          </p:stCondLst>
+                                        </p:cTn>
+                                        <p:tgtEl>
+                                          <p:spTgt spid="5">
+                                            <p:txEl>
+                                              <p:pRg st="1" end="1"/>
+                                            </p:txEl>
+                                          </p:spTgt>
+                                        </p:tgtEl>
+                                        <p:attrNameLst>
+                                          <p:attrName>style.visibility</p:attrName>
+                                        </p:attrNameLst>
+                                      </p:cBhvr>
+                                      <p:to>
+                                        <p:strVal val="visible"/>
+                                      </p:to>
+                                    </p:set>
+                                  </p:childTnLst>
+                                </p:cTn>
+                              </p:par>
+                            </p:childTnLst>
+                          </p:cTn>
+                        </p:par>
+                      </p:childTnLst>
+                    </p:cTn>
+                  </p:par>
+                </p:childTnLst>
+              </p:cTn>
+              <p:prevCondLst>
+                <p:cond evt="onPrev" delay="0">
+                  <p:tgtEl>
+                    <p:sldTgt/>
+                  </p:tgtEl>
+                </p:cond>
+              </p:prevCondLst>
+              <p:nextCondLst>
+                <p:cond evt="onNext" delay="0">
+                  <p:tgtEl>
+                    <p:sldTgt/>
+                  </p:tgtEl>
+                </p:cond>
+              </p:nextCondLst>
+            </p:seq>
+          </p:childTnLst>
+        </p:cTn>
       </p:par>
     </p:tnLst>
   </p:timing>
@@ -4740,36 +5536,87 @@
           <a:lstStyle/>
           <a:p>
             <a:r>
+              <a:rPr lang="nl-NL" dirty="0" smtClean="0">
+                <a:solidFill>
+                  <a:srgbClr val="B72922"/>
+                </a:solidFill>
+              </a:rPr>
+              <a:t>Ensembles</a:t>
+            </a:r>
+            <a:r>
               <a:rPr lang="nl-NL" dirty="0" smtClean="0"/>
-              <a:t>Ensembles</a:t>
-            </a:r>
-          </a:p>
-          <a:p>
+              <a:t> (more pipeline </a:t>
+            </a:r>
+            <a:r>
+              <a:rPr lang="nl-NL" dirty="0" err="1" smtClean="0"/>
+              <a:t>work</a:t>
+            </a:r>
             <a:r>
               <a:rPr lang="nl-NL" dirty="0" smtClean="0"/>
-              <a:t>More </a:t>
-            </a:r>
-            <a:r>
-              <a:rPr lang="nl-NL" dirty="0" err="1" smtClean="0"/>
-              <a:t>methods</a:t>
-            </a:r>
-            <a:r>
-              <a:rPr lang="nl-NL" dirty="0"/>
-              <a:t> </a:t>
-            </a:r>
-            <a:r>
-              <a:rPr lang="nl-NL" dirty="0" smtClean="0"/>
-              <a:t>(DNN)</a:t>
-            </a:r>
-          </a:p>
-          <a:p>
-            <a:r>
-              <a:rPr lang="nl-NL" dirty="0" smtClean="0"/>
-              <a:t>More data!</a:t>
-            </a:r>
-          </a:p>
-          <a:p>
-            <a:endParaRPr lang="nl-NL" dirty="0" smtClean="0"/>
+              <a:t>!)</a:t>
+            </a:r>
+          </a:p>
+          <a:p>
+            <a:r>
+              <a:rPr lang="en-US" dirty="0" smtClean="0"/>
+              <a:t>Dealing with </a:t>
+            </a:r>
+            <a:r>
+              <a:rPr lang="en-US" dirty="0" smtClean="0">
+                <a:solidFill>
+                  <a:srgbClr val="B72922"/>
+                </a:solidFill>
+              </a:rPr>
+              <a:t>anomalous data</a:t>
+            </a:r>
+          </a:p>
+          <a:p>
+            <a:r>
+              <a:rPr lang="en-US" dirty="0" smtClean="0"/>
+              <a:t>Addressing the </a:t>
+            </a:r>
+            <a:r>
+              <a:rPr lang="en-US" dirty="0" smtClean="0">
+                <a:solidFill>
+                  <a:srgbClr val="B72922"/>
+                </a:solidFill>
+              </a:rPr>
+              <a:t>test</a:t>
+            </a:r>
+            <a:r>
+              <a:rPr lang="en-US" dirty="0" smtClean="0"/>
+              <a:t> set / </a:t>
+            </a:r>
+            <a:r>
+              <a:rPr lang="en-US" dirty="0" smtClean="0">
+                <a:solidFill>
+                  <a:srgbClr val="B72922"/>
+                </a:solidFill>
+              </a:rPr>
+              <a:t>training</a:t>
+            </a:r>
+            <a:r>
+              <a:rPr lang="en-US" dirty="0" smtClean="0"/>
+              <a:t> set issues</a:t>
+            </a:r>
+          </a:p>
+          <a:p>
+            <a:r>
+              <a:rPr lang="en-US" dirty="0" smtClean="0"/>
+              <a:t>Close eye on other competitions! (e.g. </a:t>
+            </a:r>
+            <a:r>
+              <a:rPr lang="en-US" dirty="0" err="1" smtClean="0">
+                <a:solidFill>
+                  <a:srgbClr val="B72922"/>
+                </a:solidFill>
+              </a:rPr>
+              <a:t>Zestimate</a:t>
+            </a:r>
+            <a:r>
+              <a:rPr lang="en-US" dirty="0" smtClean="0"/>
+              <a:t>)</a:t>
+            </a:r>
           </a:p>
         </p:txBody>
       </p:sp>
@@ -4789,7 +5636,226 @@
   <p:timing>
     <p:tnLst>
       <p:par>
-        <p:cTn id="1" dur="indefinite" restart="never" nodeType="tmRoot"/>
+        <p:cTn id="1" dur="indefinite" restart="never" nodeType="tmRoot">
+          <p:childTnLst>
+            <p:seq concurrent="1" nextAc="seek">
+              <p:cTn id="2" dur="indefinite" nodeType="mainSeq">
+                <p:childTnLst>
+                  <p:par>
+                    <p:cTn id="3" fill="hold">
+                      <p:stCondLst>
+                        <p:cond delay="indefinite"/>
+                      </p:stCondLst>
+                      <p:childTnLst>
+                        <p:par>
+                          <p:cTn id="4" fill="hold">
+                            <p:stCondLst>
+                              <p:cond delay="0"/>
+                            </p:stCondLst>
+                            <p:childTnLst>
+                              <p:par>
+                                <p:cTn id="5" presetID="1" presetClass="entr" presetSubtype="0" fill="hold" nodeType="clickEffect">
+                                  <p:stCondLst>
+                                    <p:cond delay="0"/>
+                                  </p:stCondLst>
+                                  <p:childTnLst>
+                                    <p:set>
+                                      <p:cBhvr>
+                                        <p:cTn id="6" dur="1" fill="hold">
+                                          <p:stCondLst>
+                                            <p:cond delay="0"/>
+                                          </p:stCondLst>
+                                        </p:cTn>
+                                        <p:tgtEl>
+                                          <p:spTgt spid="5">
+                                            <p:txEl>
+                                              <p:pRg st="0" end="0"/>
+                                            </p:txEl>
+                                          </p:spTgt>
+                                        </p:tgtEl>
+                                        <p:attrNameLst>
+                                          <p:attrName>style.visibility</p:attrName>
+                                        </p:attrNameLst>
+                                      </p:cBhvr>
+                                      <p:to>
+                                        <p:strVal val="visible"/>
+                                      </p:to>
+                                    </p:set>
+                                  </p:childTnLst>
+                                </p:cTn>
+                              </p:par>
+                            </p:childTnLst>
+                          </p:cTn>
+                        </p:par>
+                      </p:childTnLst>
+                    </p:cTn>
+                  </p:par>
+                  <p:par>
+                    <p:cTn id="7" fill="hold">
+                      <p:stCondLst>
+                        <p:cond delay="indefinite"/>
+                      </p:stCondLst>
+                      <p:childTnLst>
+                        <p:par>
+                          <p:cTn id="8" fill="hold">
+                            <p:stCondLst>
+                              <p:cond delay="0"/>
+                            </p:stCondLst>
+                            <p:childTnLst>
+                              <p:par>
+                                <p:cTn id="9" presetID="1" presetClass="entr" presetSubtype="0" fill="hold" nodeType="clickEffect">
+                                  <p:stCondLst>
+                                    <p:cond delay="0"/>
+                                  </p:stCondLst>
+                                  <p:childTnLst>
+                                    <p:set>
+                                      <p:cBhvr>
+                                        <p:cTn id="10" dur="1" fill="hold">
+                                          <p:stCondLst>
+                                            <p:cond delay="0"/>
+                                          </p:stCondLst>
+                                        </p:cTn>
+                                        <p:tgtEl>
+                                          <p:spTgt spid="5">
+                                            <p:txEl>
+                                              <p:pRg st="1" end="1"/>
+                                            </p:txEl>
+                                          </p:spTgt>
+                                        </p:tgtEl>
+                                        <p:attrNameLst>
+                                          <p:attrName>style.visibility</p:attrName>
+                                        </p:attrNameLst>
+                                      </p:cBhvr>
+                                      <p:to>
+                                        <p:strVal val="visible"/>
+                                      </p:to>
+                                    </p:set>
+                                  </p:childTnLst>
+                                </p:cTn>
+                              </p:par>
+                            </p:childTnLst>
+                          </p:cTn>
+                        </p:par>
+                      </p:childTnLst>
+                    </p:cTn>
+                  </p:par>
+                  <p:par>
+                    <p:cTn id="11" fill="hold">
+                      <p:stCondLst>
+                        <p:cond delay="indefinite"/>
+                      </p:stCondLst>
+                      <p:childTnLst>
+                        <p:par>
+                          <p:cTn id="12" fill="hold">
+                            <p:stCondLst>
+                              <p:cond delay="0"/>
+                            </p:stCondLst>
+                            <p:childTnLst>
+                              <p:par>
+                                <p:cTn id="13" presetID="1" presetClass="entr" presetSubtype="0" fill="hold" nodeType="clickEffect">
+                                  <p:stCondLst>
+                                    <p:cond delay="0"/>
+                                  </p:stCondLst>
+                                  <p:childTnLst>
+                                    <p:set>
+                                      <p:cBhvr>
+                                        <p:cTn id="14" dur="1" fill="hold">
+                                          <p:stCondLst>
+                                            <p:cond delay="0"/>
+                                          </p:stCondLst>
+                                        </p:cTn>
+                                        <p:tgtEl>
+                                          <p:spTgt spid="5">
+                                            <p:txEl>
+                                              <p:pRg st="2" end="2"/>
+                                            </p:txEl>
+                                          </p:spTgt>
+                                        </p:tgtEl>
+                                        <p:attrNameLst>
+                                          <p:attrName>style.visibility</p:attrName>
+                                        </p:attrNameLst>
+                                      </p:cBhvr>
+                                      <p:to>
+                                        <p:strVal val="visible"/>
+                                      </p:to>
+                                    </p:set>
+                                  </p:childTnLst>
+                                </p:cTn>
+                              </p:par>
+                            </p:childTnLst>
+                          </p:cTn>
+                        </p:par>
+                      </p:childTnLst>
+                    </p:cTn>
+                  </p:par>
+                  <p:par>
+                    <p:cTn id="15" fill="hold">
+                      <p:stCondLst>
+                        <p:cond delay="indefinite"/>
+                      </p:stCondLst>
+                      <p:childTnLst>
+                        <p:par>
+                          <p:cTn id="16" fill="hold">
+                            <p:stCondLst>
+                              <p:cond delay="0"/>
+                            </p:stCondLst>
+                            <p:childTnLst>
+                              <p:par>
+                                <p:cTn id="17" presetID="1" presetClass="entr" presetSubtype="0" fill="hold" nodeType="clickEffect">
+                                  <p:stCondLst>
+                                    <p:cond delay="0"/>
+                                  </p:stCondLst>
+                                  <p:childTnLst>
+                                    <p:set>
+                                      <p:cBhvr>
+                                        <p:cTn id="18" dur="1" fill="hold">
+                                          <p:stCondLst>
+                                            <p:cond delay="0"/>
+                                          </p:stCondLst>
+                                        </p:cTn>
+                                        <p:tgtEl>
+                                          <p:spTgt spid="5">
+                                            <p:txEl>
+                                              <p:pRg st="3" end="3"/>
+                                            </p:txEl>
+                                          </p:spTgt>
+                                        </p:tgtEl>
+                                        <p:attrNameLst>
+                                          <p:attrName>style.visibility</p:attrName>
+                                        </p:attrNameLst>
+                                      </p:cBhvr>
+                                      <p:to>
+                                        <p:strVal val="visible"/>
+                                      </p:to>
+                                    </p:set>
+                                  </p:childTnLst>
+                                </p:cTn>
+                              </p:par>
+                            </p:childTnLst>
+                          </p:cTn>
+                        </p:par>
+                      </p:childTnLst>
+                    </p:cTn>
+                  </p:par>
+                </p:childTnLst>
+              </p:cTn>
+              <p:prevCondLst>
+                <p:cond evt="onPrev" delay="0">
+                  <p:tgtEl>
+                    <p:sldTgt/>
+                  </p:tgtEl>
+                </p:cond>
+              </p:prevCondLst>
+              <p:nextCondLst>
+                <p:cond evt="onNext" delay="0">
+                  <p:tgtEl>
+                    <p:sldTgt/>
+                  </p:tgtEl>
+                </p:cond>
+              </p:nextCondLst>
+            </p:seq>
+          </p:childTnLst>
+        </p:cTn>
       </p:par>
     </p:tnLst>
   </p:timing>
@@ -4828,15 +5894,46 @@
           <a:bodyPr/>
           <a:lstStyle/>
           <a:p>
-            <a:r>
-              <a:rPr lang="nl-NL" dirty="0" err="1" smtClean="0"/>
-              <a:t>Closing</a:t>
-            </a:r>
-            <a:r>
-              <a:rPr lang="nl-NL" dirty="0" smtClean="0"/>
-              <a:t> statement (betere naam nodig)</a:t>
-            </a:r>
-            <a:endParaRPr lang="nl-NL" dirty="0"/>
+            <a:pPr algn="ctr"/>
+            <a:r>
+              <a:rPr lang="nl-NL" sz="6000" dirty="0">
+                <a:solidFill>
+                  <a:srgbClr val="B72922"/>
+                </a:solidFill>
+              </a:rPr>
+              <a:t>Team </a:t>
+            </a:r>
+            <a:r>
+              <a:rPr lang="nl-NL" sz="6000" dirty="0" err="1">
+                <a:solidFill>
+                  <a:srgbClr val="B72922"/>
+                </a:solidFill>
+                <a:latin typeface="Stencil" panose="040409050D0802020404" pitchFamily="82" charset="0"/>
+              </a:rPr>
+              <a:t>Classified</a:t>
+            </a:r>
+            <a:r>
+              <a:rPr lang="nl-NL" sz="6000" dirty="0">
+                <a:solidFill>
+                  <a:srgbClr val="B72922"/>
+                </a:solidFill>
+                <a:latin typeface="Stencil" panose="040409050D0802020404" pitchFamily="82" charset="0"/>
+              </a:rPr>
+              <a:t/>
+            </a:r>
+            <a:br>
+              <a:rPr lang="nl-NL" sz="6000" dirty="0">
+                <a:solidFill>
+                  <a:srgbClr val="B72922"/>
+                </a:solidFill>
+                <a:latin typeface="Stencil" panose="040409050D0802020404" pitchFamily="82" charset="0"/>
+              </a:rPr>
+            </a:br>
+            <a:endParaRPr lang="nl-NL" sz="6000" dirty="0">
+              <a:solidFill>
+                <a:srgbClr val="B72922"/>
+              </a:solidFill>
+            </a:endParaRPr>
           </a:p>
         </p:txBody>
       </p:sp>
@@ -4852,7 +5949,7 @@
         </p:nvSpPr>
         <p:spPr>
           <a:xfrm>
-            <a:off x="1052603" y="3990109"/>
+            <a:off x="1052603" y="4717472"/>
             <a:ext cx="14889249" cy="4391891"/>
           </a:xfrm>
         </p:spPr>
@@ -4862,31 +5959,7 @@
           <a:p>
             <a:pPr algn="ctr"/>
             <a:r>
-              <a:rPr lang="nl-NL" sz="3200" dirty="0" smtClean="0">
-                <a:solidFill>
-                  <a:schemeClr val="bg1"/>
-                </a:solidFill>
-              </a:rPr>
-              <a:t>Team </a:t>
-            </a:r>
-            <a:r>
-              <a:rPr lang="nl-NL" sz="3200" dirty="0" err="1" smtClean="0">
-                <a:solidFill>
-                  <a:schemeClr val="bg1"/>
-                </a:solidFill>
-              </a:rPr>
-              <a:t>Classified</a:t>
-            </a:r>
-            <a:endParaRPr lang="nl-NL" sz="3200" dirty="0" smtClean="0">
-              <a:solidFill>
-                <a:schemeClr val="bg1"/>
-              </a:solidFill>
-            </a:endParaRPr>
-          </a:p>
-          <a:p>
-            <a:pPr algn="ctr"/>
-            <a:r>
-              <a:rPr lang="nl-NL" sz="3200" dirty="0" err="1" smtClean="0">
+              <a:rPr lang="en-US" sz="3200" b="1" dirty="0" err="1" smtClean="0">
                 <a:solidFill>
                   <a:schemeClr val="bg1"/>
                 </a:solidFill>
@@ -4894,167 +5967,45 @@
               <a:t>Sberbank</a:t>
             </a:r>
             <a:r>
-              <a:rPr lang="nl-NL" sz="3200" dirty="0" smtClean="0">
+              <a:rPr lang="en-US" sz="3200" b="1" dirty="0" smtClean="0">
                 <a:solidFill>
                   <a:schemeClr val="bg1"/>
                 </a:solidFill>
               </a:rPr>
-              <a:t> </a:t>
-            </a:r>
-            <a:r>
-              <a:rPr lang="nl-NL" sz="3200" dirty="0" err="1" smtClean="0">
+              <a:t> Housing Prices</a:t>
+            </a:r>
+          </a:p>
+          <a:p>
+            <a:pPr algn="ctr"/>
+            <a:r>
+              <a:rPr lang="en-US" sz="3200" dirty="0" smtClean="0">
                 <a:solidFill>
                   <a:schemeClr val="bg1"/>
                 </a:solidFill>
               </a:rPr>
-              <a:t>Housing</a:t>
-            </a:r>
-            <a:r>
-              <a:rPr lang="nl-NL" sz="3200" dirty="0" smtClean="0">
+              <a:t>Challenges: Data quality, test set different from train</a:t>
+            </a:r>
+          </a:p>
+          <a:p>
+            <a:pPr algn="ctr"/>
+            <a:r>
+              <a:rPr lang="en-US" sz="3200" dirty="0" smtClean="0">
                 <a:solidFill>
                   <a:schemeClr val="bg1"/>
                 </a:solidFill>
               </a:rPr>
-              <a:t> </a:t>
-            </a:r>
-            <a:r>
-              <a:rPr lang="nl-NL" sz="3200" dirty="0" err="1" smtClean="0">
+              <a:t>Approach: Ensembles, exploring data enrichment</a:t>
+            </a:r>
+          </a:p>
+          <a:p>
+            <a:pPr algn="ctr"/>
+            <a:r>
+              <a:rPr lang="en-US" sz="3200" dirty="0" smtClean="0">
                 <a:solidFill>
                   <a:schemeClr val="bg1"/>
                 </a:solidFill>
               </a:rPr>
-              <a:t>Prices</a:t>
-            </a:r>
-            <a:endParaRPr lang="nl-NL" sz="3200" dirty="0" smtClean="0">
-              <a:solidFill>
-                <a:schemeClr val="bg1"/>
-              </a:solidFill>
-            </a:endParaRPr>
-          </a:p>
-          <a:p>
-            <a:pPr algn="ctr"/>
-            <a:r>
-              <a:rPr lang="nl-NL" sz="3200" dirty="0" err="1" smtClean="0">
-                <a:solidFill>
-                  <a:schemeClr val="bg1"/>
-                </a:solidFill>
-              </a:rPr>
-              <a:t>Challenges</a:t>
-            </a:r>
-            <a:r>
-              <a:rPr lang="nl-NL" sz="3200" dirty="0" smtClean="0">
-                <a:solidFill>
-                  <a:schemeClr val="bg1"/>
-                </a:solidFill>
-              </a:rPr>
-              <a:t>: Data </a:t>
-            </a:r>
-            <a:r>
-              <a:rPr lang="nl-NL" sz="3200" dirty="0" err="1" smtClean="0">
-                <a:solidFill>
-                  <a:schemeClr val="bg1"/>
-                </a:solidFill>
-              </a:rPr>
-              <a:t>quality</a:t>
-            </a:r>
-            <a:r>
-              <a:rPr lang="nl-NL" sz="3200" dirty="0" smtClean="0">
-                <a:solidFill>
-                  <a:schemeClr val="bg1"/>
-                </a:solidFill>
-              </a:rPr>
-              <a:t>, test set different </a:t>
-            </a:r>
-            <a:r>
-              <a:rPr lang="nl-NL" sz="3200" dirty="0" err="1" smtClean="0">
-                <a:solidFill>
-                  <a:schemeClr val="bg1"/>
-                </a:solidFill>
-              </a:rPr>
-              <a:t>from</a:t>
-            </a:r>
-            <a:r>
-              <a:rPr lang="nl-NL" sz="3200" dirty="0" smtClean="0">
-                <a:solidFill>
-                  <a:schemeClr val="bg1"/>
-                </a:solidFill>
-              </a:rPr>
-              <a:t> train</a:t>
-            </a:r>
-          </a:p>
-          <a:p>
-            <a:pPr algn="ctr"/>
-            <a:r>
-              <a:rPr lang="nl-NL" sz="3200" dirty="0" smtClean="0">
-                <a:solidFill>
-                  <a:schemeClr val="bg1"/>
-                </a:solidFill>
-              </a:rPr>
-              <a:t>Approach: Ensembles, </a:t>
-            </a:r>
-            <a:r>
-              <a:rPr lang="nl-NL" sz="3200" dirty="0" err="1" smtClean="0">
-                <a:solidFill>
-                  <a:schemeClr val="bg1"/>
-                </a:solidFill>
-              </a:rPr>
-              <a:t>exploring</a:t>
-            </a:r>
-            <a:r>
-              <a:rPr lang="nl-NL" sz="3200" dirty="0" smtClean="0">
-                <a:solidFill>
-                  <a:schemeClr val="bg1"/>
-                </a:solidFill>
-              </a:rPr>
-              <a:t> </a:t>
-            </a:r>
-            <a:r>
-              <a:rPr lang="nl-NL" sz="3200" dirty="0" err="1" smtClean="0">
-                <a:solidFill>
-                  <a:schemeClr val="bg1"/>
-                </a:solidFill>
-              </a:rPr>
-              <a:t>creative</a:t>
-            </a:r>
-            <a:r>
-              <a:rPr lang="nl-NL" sz="3200" dirty="0" smtClean="0">
-                <a:solidFill>
-                  <a:schemeClr val="bg1"/>
-                </a:solidFill>
-              </a:rPr>
-              <a:t> data </a:t>
-            </a:r>
-            <a:r>
-              <a:rPr lang="nl-NL" sz="3200" dirty="0" err="1" smtClean="0">
-                <a:solidFill>
-                  <a:schemeClr val="bg1"/>
-                </a:solidFill>
-              </a:rPr>
-              <a:t>enrichment</a:t>
-            </a:r>
-            <a:endParaRPr lang="nl-NL" sz="3200" dirty="0">
-              <a:solidFill>
-                <a:schemeClr val="bg1"/>
-              </a:solidFill>
-            </a:endParaRPr>
-          </a:p>
-          <a:p>
-            <a:pPr algn="ctr"/>
-            <a:r>
-              <a:rPr lang="nl-NL" sz="3200" dirty="0" err="1" smtClean="0">
-                <a:solidFill>
-                  <a:schemeClr val="bg1"/>
-                </a:solidFill>
-              </a:rPr>
-              <a:t>Current</a:t>
-            </a:r>
-            <a:r>
-              <a:rPr lang="nl-NL" sz="3200" dirty="0" smtClean="0">
-                <a:solidFill>
-                  <a:schemeClr val="bg1"/>
-                </a:solidFill>
-              </a:rPr>
-              <a:t> rank …/…</a:t>
+              <a:t>Current rank about 720 of 2400 </a:t>
             </a:r>
           </a:p>
           <a:p>
@@ -5079,84 +6030,6 @@
     <p:extLst>
       <p:ext uri="{BB962C8B-B14F-4D97-AF65-F5344CB8AC3E}">
         <p14:creationId xmlns:p14="http://schemas.microsoft.com/office/powerpoint/2010/main" val="1351034785"/>
-      </p:ext>
-    </p:extLst>
-  </p:cSld>
-  <p:clrMapOvr>
-    <a:masterClrMapping/>
-  </p:clrMapOvr>
-  <p:transition spd="med">
-    <p:fade/>
-  </p:transition>
-  <p:timing>
-    <p:tnLst>
-      <p:par>
-        <p:cTn id="1" dur="indefinite" restart="never" nodeType="tmRoot"/>
-      </p:par>
-    </p:tnLst>
-  </p:timing>
-</p:sld>
-</file>
-
-<file path=ppt/slides/slide8.xml><?xml version="1.0" encoding="utf-8"?>
-<p:sld xmlns:a="http://schemas.openxmlformats.org/drawingml/2006/main" xmlns:r="http://schemas.openxmlformats.org/officeDocument/2006/relationships" xmlns:p="http://schemas.openxmlformats.org/presentationml/2006/main">
-  <p:cSld>
-    <p:spTree>
-      <p:nvGrpSpPr>
-        <p:cNvPr id="1" name=""/>
-        <p:cNvGrpSpPr/>
-        <p:nvPr/>
-      </p:nvGrpSpPr>
-      <p:grpSpPr>
-        <a:xfrm>
-          <a:off x="0" y="0"/>
-          <a:ext cx="0" cy="0"/>
-          <a:chOff x="0" y="0"/>
-          <a:chExt cx="0" cy="0"/>
-        </a:xfrm>
-      </p:grpSpPr>
-      <p:sp>
-        <p:nvSpPr>
-          <p:cNvPr id="4" name="Titel 3"/>
-          <p:cNvSpPr>
-            <a:spLocks noGrp="1"/>
-          </p:cNvSpPr>
-          <p:nvPr>
-            <p:ph type="title"/>
-          </p:nvPr>
-        </p:nvSpPr>
-        <p:spPr/>
-        <p:txBody>
-          <a:bodyPr/>
-          <a:lstStyle/>
-          <a:p>
-            <a:endParaRPr lang="nl-NL"/>
-          </a:p>
-        </p:txBody>
-      </p:sp>
-      <p:sp>
-        <p:nvSpPr>
-          <p:cNvPr id="5" name="Tijdelijke aanduiding voor inhoud 4"/>
-          <p:cNvSpPr>
-            <a:spLocks noGrp="1"/>
-          </p:cNvSpPr>
-          <p:nvPr>
-            <p:ph idx="1"/>
-          </p:nvPr>
-        </p:nvSpPr>
-        <p:spPr/>
-        <p:txBody>
-          <a:bodyPr/>
-          <a:lstStyle/>
-          <a:p>
-            <a:endParaRPr lang="nl-NL"/>
-          </a:p>
-        </p:txBody>
-      </p:sp>
-    </p:spTree>
-    <p:extLst>
-      <p:ext uri="{BB962C8B-B14F-4D97-AF65-F5344CB8AC3E}">
-        <p14:creationId xmlns:p14="http://schemas.microsoft.com/office/powerpoint/2010/main" val="1497031764"/>
       </p:ext>
     </p:extLst>
   </p:cSld>

</xml_diff>

<commit_message>
Flashtalk: added graphs and plots, minor text fixes
</commit_message>
<xml_diff>
--- a/Presentatie/Flashtalk 2 (Jeffrey).pptx
+++ b/Presentatie/Flashtalk 2 (Jeffrey).pptx
@@ -285,7 +285,7 @@
             <a:fld id="{17A39E9D-B438-D94D-AF2A-93757548558C}" type="datetime1">
               <a:rPr lang="nl-NL" altLang="nl-NL"/>
               <a:pPr/>
-              <a:t>31-5-2017</a:t>
+              <a:t>1-6-2017</a:t>
             </a:fld>
             <a:endParaRPr lang="nl-NL" altLang="nl-NL"/>
           </a:p>
@@ -497,7 +497,7 @@
             <a:fld id="{3AA95554-0BC3-EC48-BCE0-DB850053191D}" type="datetime1">
               <a:rPr lang="nl-NL" altLang="nl-NL"/>
               <a:pPr/>
-              <a:t>31-5-2017</a:t>
+              <a:t>1-6-2017</a:t>
             </a:fld>
             <a:endParaRPr lang="nl-NL" altLang="nl-NL"/>
           </a:p>
@@ -1020,7 +1020,7 @@
           <a:p>
             <a:fld id="{9E1ED08B-741D-9E48-95DA-82644AB503BC}" type="datetime1">
               <a:rPr lang="nl-NL" altLang="nl-NL" smtClean="0"/>
-              <a:t>31-5-2017</a:t>
+              <a:t>1-6-2017</a:t>
             </a:fld>
             <a:endParaRPr lang="nl-NL" altLang="nl-NL"/>
           </a:p>
@@ -1391,7 +1391,7 @@
             <a:fld id="{9E1ED08B-741D-9E48-95DA-82644AB503BC}" type="datetime1">
               <a:rPr lang="nl-NL" altLang="nl-NL" smtClean="0"/>
               <a:pPr/>
-              <a:t>31-5-2017</a:t>
+              <a:t>1-6-2017</a:t>
             </a:fld>
             <a:endParaRPr lang="nl-NL" altLang="nl-NL" dirty="0"/>
           </a:p>
@@ -1633,7 +1633,7 @@
           <a:p>
             <a:fld id="{46CB0545-8C00-A544-A88F-C33FBC7A7630}" type="datetime1">
               <a:rPr lang="nl-NL" altLang="nl-NL" smtClean="0"/>
-              <a:t>31-5-2017</a:t>
+              <a:t>1-6-2017</a:t>
             </a:fld>
             <a:endParaRPr lang="nl-NL" altLang="nl-NL" dirty="0"/>
           </a:p>
@@ -2003,7 +2003,7 @@
           <a:p>
             <a:fld id="{46CB0545-8C00-A544-A88F-C33FBC7A7630}" type="datetime1">
               <a:rPr lang="nl-NL" altLang="nl-NL" smtClean="0"/>
-              <a:t>31-5-2017</a:t>
+              <a:t>1-6-2017</a:t>
             </a:fld>
             <a:endParaRPr lang="nl-NL" altLang="nl-NL" dirty="0"/>
           </a:p>
@@ -2235,7 +2235,7 @@
               </a14:hiddenLine>
             </a:ext>
             <a:ext uri="{FAA26D3D-D897-4be2-8F04-BA451C77F1D7}">
-              <ma14:placeholderFlag xmlns:ma14="http://schemas.microsoft.com/office/mac/drawingml/2011/main" xmlns="" val="1"/>
+              <ma14:placeholderFlag xmlns="" xmlns:ma14="http://schemas.microsoft.com/office/mac/drawingml/2011/main" val="1"/>
             </a:ext>
           </a:extLst>
         </p:spPr>
@@ -2296,7 +2296,7 @@
               </a14:hiddenLine>
             </a:ext>
             <a:ext uri="{FAA26D3D-D897-4be2-8F04-BA451C77F1D7}">
-              <ma14:placeholderFlag xmlns:ma14="http://schemas.microsoft.com/office/mac/drawingml/2011/main" xmlns="" val="1"/>
+              <ma14:placeholderFlag xmlns="" xmlns:ma14="http://schemas.microsoft.com/office/mac/drawingml/2011/main" val="1"/>
             </a:ext>
           </a:extLst>
         </p:spPr>
@@ -2476,7 +2476,7 @@
             <a:fld id="{B3873A8C-A209-FC40-86BC-D3E9A671FD81}" type="datetime1">
               <a:rPr lang="nl-NL" altLang="nl-NL" smtClean="0"/>
               <a:pPr/>
-              <a:t>31-5-2017</a:t>
+              <a:t>1-6-2017</a:t>
             </a:fld>
             <a:endParaRPr lang="nl-NL" altLang="nl-NL" dirty="0"/>
           </a:p>
@@ -2974,7 +2974,7 @@
               </a14:hiddenLine>
             </a:ext>
             <a:ext uri="{FAA26D3D-D897-4be2-8F04-BA451C77F1D7}">
-              <ma14:placeholderFlag xmlns:ma14="http://schemas.microsoft.com/office/mac/drawingml/2011/main" xmlns="" val="1"/>
+              <ma14:placeholderFlag xmlns="" xmlns:ma14="http://schemas.microsoft.com/office/mac/drawingml/2011/main" val="1"/>
             </a:ext>
           </a:extLst>
         </p:spPr>
@@ -3035,7 +3035,7 @@
               </a14:hiddenLine>
             </a:ext>
             <a:ext uri="{FAA26D3D-D897-4be2-8F04-BA451C77F1D7}">
-              <ma14:placeholderFlag xmlns:ma14="http://schemas.microsoft.com/office/mac/drawingml/2011/main" xmlns="" val="1"/>
+              <ma14:placeholderFlag xmlns="" xmlns:ma14="http://schemas.microsoft.com/office/mac/drawingml/2011/main" val="1"/>
             </a:ext>
           </a:extLst>
         </p:spPr>
@@ -3216,7 +3216,7 @@
             <a:fld id="{FB5CF2AB-20FF-5442-9E53-3C6EDD7FBCEA}" type="datetime1">
               <a:rPr lang="nl-NL" altLang="nl-NL" smtClean="0"/>
               <a:pPr/>
-              <a:t>31-5-2017</a:t>
+              <a:t>1-6-2017</a:t>
             </a:fld>
             <a:endParaRPr lang="nl-NL" altLang="nl-NL" dirty="0"/>
           </a:p>
@@ -4707,11 +4707,7 @@
             </a:r>
             <a:r>
               <a:rPr lang="nl-NL" dirty="0" smtClean="0"/>
-              <a:t>: Data Exp</a:t>
-            </a:r>
-            <a:r>
-              <a:rPr lang="nl-NL" dirty="0" smtClean="0"/>
-              <a:t>loration</a:t>
+              <a:t>: Data Exploration</a:t>
             </a:r>
             <a:endParaRPr lang="nl-NL" dirty="0"/>
           </a:p>
@@ -4821,19 +4817,119 @@
             </a:r>
             <a:r>
               <a:rPr lang="nl-NL" dirty="0" smtClean="0"/>
-              <a:t>: Python / Apache </a:t>
-            </a:r>
-            <a:r>
-              <a:rPr lang="nl-NL" dirty="0" err="1" smtClean="0"/>
+              <a:t>: </a:t>
+            </a:r>
+            <a:r>
+              <a:rPr lang="nl-NL" dirty="0" smtClean="0">
+                <a:solidFill>
+                  <a:srgbClr val="B72922"/>
+                </a:solidFill>
+              </a:rPr>
+              <a:t>Python</a:t>
+            </a:r>
+            <a:r>
+              <a:rPr lang="nl-NL" dirty="0" smtClean="0"/>
+              <a:t> / Apache </a:t>
+            </a:r>
+            <a:r>
+              <a:rPr lang="nl-NL" dirty="0" err="1" smtClean="0">
+                <a:solidFill>
+                  <a:srgbClr val="B72922"/>
+                </a:solidFill>
+              </a:rPr>
               <a:t>Spark</a:t>
             </a:r>
             <a:r>
               <a:rPr lang="nl-NL" dirty="0" smtClean="0"/>
-              <a:t> / Leaflet.js</a:t>
+              <a:t> / </a:t>
+            </a:r>
+            <a:r>
+              <a:rPr lang="nl-NL" dirty="0" smtClean="0">
+                <a:solidFill>
+                  <a:srgbClr val="B72922"/>
+                </a:solidFill>
+              </a:rPr>
+              <a:t>Leaflet</a:t>
+            </a:r>
+            <a:r>
+              <a:rPr lang="nl-NL" dirty="0" smtClean="0"/>
+              <a:t>.js</a:t>
             </a:r>
           </a:p>
         </p:txBody>
       </p:sp>
+      <p:pic>
+        <p:nvPicPr>
+          <p:cNvPr id="7" name="Picture 6"/>
+          <p:cNvPicPr>
+            <a:picLocks noChangeAspect="1"/>
+          </p:cNvPicPr>
+          <p:nvPr/>
+        </p:nvPicPr>
+        <p:blipFill>
+          <a:blip r:embed="rId2"/>
+          <a:stretch>
+            <a:fillRect/>
+          </a:stretch>
+        </p:blipFill>
+        <p:spPr>
+          <a:xfrm>
+            <a:off x="719346" y="3629159"/>
+            <a:ext cx="4714286" cy="3361905"/>
+          </a:xfrm>
+          <a:prstGeom prst="rect">
+            <a:avLst/>
+          </a:prstGeom>
+        </p:spPr>
+      </p:pic>
+      <p:pic>
+        <p:nvPicPr>
+          <p:cNvPr id="8" name="Picture 7"/>
+          <p:cNvPicPr>
+            <a:picLocks noChangeAspect="1"/>
+          </p:cNvPicPr>
+          <p:nvPr/>
+        </p:nvPicPr>
+        <p:blipFill>
+          <a:blip r:embed="rId3"/>
+          <a:stretch>
+            <a:fillRect/>
+          </a:stretch>
+        </p:blipFill>
+        <p:spPr>
+          <a:xfrm>
+            <a:off x="5914104" y="3724397"/>
+            <a:ext cx="4847619" cy="3266667"/>
+          </a:xfrm>
+          <a:prstGeom prst="rect">
+            <a:avLst/>
+          </a:prstGeom>
+        </p:spPr>
+      </p:pic>
+      <p:pic>
+        <p:nvPicPr>
+          <p:cNvPr id="9" name="Picture 8"/>
+          <p:cNvPicPr>
+            <a:picLocks noChangeAspect="1"/>
+          </p:cNvPicPr>
+          <p:nvPr/>
+        </p:nvPicPr>
+        <p:blipFill>
+          <a:blip r:embed="rId4"/>
+          <a:stretch>
+            <a:fillRect/>
+          </a:stretch>
+        </p:blipFill>
+        <p:spPr>
+          <a:xfrm>
+            <a:off x="11242195" y="3724397"/>
+            <a:ext cx="6039931" cy="3266667"/>
+          </a:xfrm>
+          <a:prstGeom prst="rect">
+            <a:avLst/>
+          </a:prstGeom>
+        </p:spPr>
+      </p:pic>
     </p:spTree>
     <p:extLst>
       <p:ext uri="{BB962C8B-B14F-4D97-AF65-F5344CB8AC3E}">
@@ -4953,6 +5049,105 @@
                       </p:childTnLst>
                     </p:cTn>
                   </p:par>
+                  <p:par>
+                    <p:cTn id="11" fill="hold">
+                      <p:stCondLst>
+                        <p:cond delay="indefinite"/>
+                      </p:stCondLst>
+                      <p:childTnLst>
+                        <p:par>
+                          <p:cTn id="12" fill="hold">
+                            <p:stCondLst>
+                              <p:cond delay="0"/>
+                            </p:stCondLst>
+                            <p:childTnLst>
+                              <p:par>
+                                <p:cTn id="13" presetID="1" presetClass="entr" presetSubtype="0" fill="hold" nodeType="clickEffect">
+                                  <p:stCondLst>
+                                    <p:cond delay="0"/>
+                                  </p:stCondLst>
+                                  <p:childTnLst>
+                                    <p:set>
+                                      <p:cBhvr>
+                                        <p:cTn id="14" dur="1" fill="hold">
+                                          <p:stCondLst>
+                                            <p:cond delay="0"/>
+                                          </p:stCondLst>
+                                        </p:cTn>
+                                        <p:tgtEl>
+                                          <p:spTgt spid="7"/>
+                                        </p:tgtEl>
+                                        <p:attrNameLst>
+                                          <p:attrName>style.visibility</p:attrName>
+                                        </p:attrNameLst>
+                                      </p:cBhvr>
+                                      <p:to>
+                                        <p:strVal val="visible"/>
+                                      </p:to>
+                                    </p:set>
+                                  </p:childTnLst>
+                                </p:cTn>
+                              </p:par>
+                              <p:par>
+                                <p:cTn id="15" presetID="1" presetClass="entr" presetSubtype="0" fill="hold" nodeType="withEffect">
+                                  <p:stCondLst>
+                                    <p:cond delay="0"/>
+                                  </p:stCondLst>
+                                  <p:childTnLst>
+                                    <p:set>
+                                      <p:cBhvr>
+                                        <p:cTn id="16" dur="1" fill="hold">
+                                          <p:stCondLst>
+                                            <p:cond delay="0"/>
+                                          </p:stCondLst>
+                                        </p:cTn>
+                                        <p:tgtEl>
+                                          <p:spTgt spid="8"/>
+                                        </p:tgtEl>
+                                        <p:attrNameLst>
+                                          <p:attrName>style.visibility</p:attrName>
+                                        </p:attrNameLst>
+                                      </p:cBhvr>
+                                      <p:to>
+                                        <p:strVal val="visible"/>
+                                      </p:to>
+                                    </p:set>
+                                  </p:childTnLst>
+                                </p:cTn>
+                              </p:par>
+                              <p:par>
+                                <p:cTn id="17" presetID="1" presetClass="entr" presetSubtype="0" fill="hold" nodeType="withEffect">
+                                  <p:stCondLst>
+                                    <p:cond delay="0"/>
+                                  </p:stCondLst>
+                                  <p:childTnLst>
+                                    <p:set>
+                                      <p:cBhvr>
+                                        <p:cTn id="18" dur="1" fill="hold">
+                                          <p:stCondLst>
+                                            <p:cond delay="0"/>
+                                          </p:stCondLst>
+                                        </p:cTn>
+                                        <p:tgtEl>
+                                          <p:spTgt spid="9"/>
+                                        </p:tgtEl>
+                                        <p:attrNameLst>
+                                          <p:attrName>style.visibility</p:attrName>
+                                        </p:attrNameLst>
+                                      </p:cBhvr>
+                                      <p:to>
+                                        <p:strVal val="visible"/>
+                                      </p:to>
+                                    </p:set>
+                                  </p:childTnLst>
+                                </p:cTn>
+                              </p:par>
+                            </p:childTnLst>
+                          </p:cTn>
+                        </p:par>
+                      </p:childTnLst>
+                    </p:cTn>
+                  </p:par>
                 </p:childTnLst>
               </p:cTn>
               <p:prevCondLst>
@@ -5035,26 +5230,17 @@
           <a:p>
             <a:r>
               <a:rPr lang="en-US" dirty="0" smtClean="0"/>
-              <a:t>Missing data:  </a:t>
-            </a:r>
+              <a:t>Missing data:  replacing with representative values, pruning, with respect to the data</a:t>
+            </a:r>
+          </a:p>
+          <a:p>
             <a:r>
               <a:rPr lang="en-US" dirty="0" smtClean="0"/>
-              <a:t>replacing with representative values, pruning, with respect to the data</a:t>
-            </a:r>
-            <a:endParaRPr lang="en-US" dirty="0" smtClean="0"/>
-          </a:p>
-          <a:p>
+              <a:t>Implementing some go-to tools to see what we get</a:t>
+            </a:r>
             <a:r>
               <a:rPr lang="en-US" dirty="0" smtClean="0"/>
-              <a:t>Implementing some </a:t>
-            </a:r>
-            <a:r>
-              <a:rPr lang="en-US" dirty="0" smtClean="0"/>
-              <a:t>go-to tools </a:t>
-            </a:r>
-            <a:r>
-              <a:rPr lang="en-US" dirty="0" smtClean="0"/>
-              <a:t>to see what we get: </a:t>
+              <a:t>: e.g. </a:t>
             </a:r>
             <a:r>
               <a:rPr lang="en-US" dirty="0" err="1" smtClean="0">
@@ -5062,7 +5248,15 @@
                   <a:srgbClr val="B72922"/>
                 </a:solidFill>
               </a:rPr>
-              <a:t>XGBoost</a:t>
+              <a:t>XGBoos</a:t>
+            </a:r>
+            <a:r>
+              <a:rPr lang="en-US" dirty="0" err="1" smtClean="0">
+                <a:solidFill>
+                  <a:srgbClr val="B72922"/>
+                </a:solidFill>
+              </a:rPr>
+              <a:t>t</a:t>
             </a:r>
             <a:r>
               <a:rPr lang="en-US" dirty="0" smtClean="0">
@@ -5070,8 +5264,13 @@
                   <a:srgbClr val="B72922"/>
                 </a:solidFill>
               </a:rPr>
-              <a:t> </a:t>
-            </a:r>
+              <a:t>, </a:t>
+            </a:r>
+            <a:r>
+              <a:rPr lang="en-US" dirty="0" smtClean="0"/>
+              <a:t>RF, DNN</a:t>
+            </a:r>
+            <a:endParaRPr lang="en-US" dirty="0" smtClean="0"/>
           </a:p>
           <a:p>
             <a:pPr marL="0" indent="0">
@@ -5091,6 +5290,118 @@
           </a:p>
           <a:p>
             <a:endParaRPr lang="nl-NL" dirty="0"/>
+          </a:p>
+        </p:txBody>
+      </p:sp>
+      <p:pic>
+        <p:nvPicPr>
+          <p:cNvPr id="2" name="Picture 1"/>
+          <p:cNvPicPr>
+            <a:picLocks noChangeAspect="1"/>
+          </p:cNvPicPr>
+          <p:nvPr/>
+        </p:nvPicPr>
+        <p:blipFill>
+          <a:blip r:embed="rId2"/>
+          <a:stretch>
+            <a:fillRect/>
+          </a:stretch>
+        </p:blipFill>
+        <p:spPr>
+          <a:xfrm>
+            <a:off x="5532211" y="3609999"/>
+            <a:ext cx="5295238" cy="3400000"/>
+          </a:xfrm>
+          <a:prstGeom prst="rect">
+            <a:avLst/>
+          </a:prstGeom>
+        </p:spPr>
+      </p:pic>
+      <p:sp>
+        <p:nvSpPr>
+          <p:cNvPr id="3" name="TextBox 2"/>
+          <p:cNvSpPr txBox="1"/>
+          <p:nvPr/>
+        </p:nvSpPr>
+        <p:spPr>
+          <a:xfrm>
+            <a:off x="5997654" y="6914861"/>
+            <a:ext cx="5295238" cy="338554"/>
+          </a:xfrm>
+          <a:prstGeom prst="rect">
+            <a:avLst/>
+          </a:prstGeom>
+          <a:noFill/>
+        </p:spPr>
+        <p:txBody>
+          <a:bodyPr wrap="square" rtlCol="0">
+            <a:spAutoFit/>
+          </a:bodyPr>
+          <a:lstStyle/>
+          <a:p>
+            <a:r>
+              <a:rPr lang="nl-NL" sz="1600" dirty="0" smtClean="0">
+                <a:solidFill>
+                  <a:schemeClr val="bg1">
+                    <a:lumMod val="50000"/>
+                  </a:schemeClr>
+                </a:solidFill>
+                <a:latin typeface="+mn-lt"/>
+              </a:rPr>
+              <a:t>Feature </a:t>
+            </a:r>
+            <a:r>
+              <a:rPr lang="nl-NL" sz="1600" dirty="0" err="1" smtClean="0">
+                <a:solidFill>
+                  <a:schemeClr val="bg1">
+                    <a:lumMod val="50000"/>
+                  </a:schemeClr>
+                </a:solidFill>
+                <a:latin typeface="+mn-lt"/>
+              </a:rPr>
+              <a:t>importance</a:t>
+            </a:r>
+            <a:r>
+              <a:rPr lang="nl-NL" sz="1600" dirty="0" smtClean="0">
+                <a:solidFill>
+                  <a:schemeClr val="bg1">
+                    <a:lumMod val="50000"/>
+                  </a:schemeClr>
+                </a:solidFill>
+                <a:latin typeface="+mn-lt"/>
+              </a:rPr>
+              <a:t> (</a:t>
+            </a:r>
+            <a:r>
+              <a:rPr lang="nl-NL" sz="1600" dirty="0" err="1" smtClean="0">
+                <a:solidFill>
+                  <a:schemeClr val="bg1">
+                    <a:lumMod val="50000"/>
+                  </a:schemeClr>
+                </a:solidFill>
+                <a:latin typeface="+mn-lt"/>
+              </a:rPr>
+              <a:t>XGBoost</a:t>
+            </a:r>
+            <a:r>
+              <a:rPr lang="nl-NL" sz="1600" dirty="0" smtClean="0">
+                <a:solidFill>
+                  <a:schemeClr val="bg1">
+                    <a:lumMod val="50000"/>
+                  </a:schemeClr>
+                </a:solidFill>
+                <a:latin typeface="+mn-lt"/>
+              </a:rPr>
+              <a:t>)</a:t>
+            </a:r>
+            <a:endParaRPr lang="nl-NL" sz="1600" dirty="0" smtClean="0">
+              <a:solidFill>
+                <a:schemeClr val="bg1">
+                  <a:lumMod val="50000"/>
+                </a:schemeClr>
+              </a:solidFill>
+              <a:latin typeface="+mn-lt"/>
+            </a:endParaRPr>
           </a:p>
         </p:txBody>
       </p:sp>
@@ -5213,6 +5524,51 @@
                       </p:childTnLst>
                     </p:cTn>
                   </p:par>
+                  <p:par>
+                    <p:cTn id="11" fill="hold">
+                      <p:stCondLst>
+                        <p:cond delay="indefinite"/>
+                      </p:stCondLst>
+                      <p:childTnLst>
+                        <p:par>
+                          <p:cTn id="12" fill="hold">
+                            <p:stCondLst>
+                              <p:cond delay="0"/>
+                            </p:stCondLst>
+                            <p:childTnLst>
+                              <p:par>
+                                <p:cTn id="13" presetID="1" presetClass="entr" presetSubtype="0" fill="hold" nodeType="clickEffect">
+                                  <p:stCondLst>
+                                    <p:cond delay="0"/>
+                                  </p:stCondLst>
+                                  <p:childTnLst>
+                                    <p:set>
+                                      <p:cBhvr>
+                                        <p:cTn id="14" dur="1" fill="hold">
+                                          <p:stCondLst>
+                                            <p:cond delay="0"/>
+                                          </p:stCondLst>
+                                        </p:cTn>
+                                        <p:tgtEl>
+                                          <p:spTgt spid="2"/>
+                                        </p:tgtEl>
+                                        <p:attrNameLst>
+                                          <p:attrName>style.visibility</p:attrName>
+                                        </p:attrNameLst>
+                                      </p:cBhvr>
+                                      <p:to>
+                                        <p:strVal val="visible"/>
+                                      </p:to>
+                                    </p:set>
+                                  </p:childTnLst>
+                                </p:cTn>
+                              </p:par>
+                            </p:childTnLst>
+                          </p:cTn>
+                        </p:par>
+                      </p:childTnLst>
+                    </p:cTn>
+                  </p:par>
                 </p:childTnLst>
               </p:cTn>
               <p:prevCondLst>
@@ -5311,11 +5667,7 @@
             </a:r>
             <a:r>
               <a:rPr lang="nl-NL" dirty="0" smtClean="0"/>
-              <a:t> rank</a:t>
-            </a:r>
-            <a:r>
-              <a:rPr lang="nl-NL" dirty="0" smtClean="0"/>
-              <a:t>: </a:t>
+              <a:t> rank: </a:t>
             </a:r>
           </a:p>
           <a:p>
@@ -5330,11 +5682,6 @@
               </a:rPr>
               <a:t>			~720 of ~2400</a:t>
             </a:r>
-            <a:endParaRPr lang="nl-NL" sz="4800" dirty="0" smtClean="0">
-              <a:solidFill>
-                <a:srgbClr val="B72922"/>
-              </a:solidFill>
-            </a:endParaRPr>
           </a:p>
         </p:txBody>
       </p:sp>
@@ -5978,34 +6325,58 @@
           <a:p>
             <a:pPr algn="ctr"/>
             <a:r>
+              <a:rPr lang="en-US" sz="3200" i="1" dirty="0" smtClean="0">
+                <a:solidFill>
+                  <a:schemeClr val="bg1"/>
+                </a:solidFill>
+              </a:rPr>
+              <a:t>Challenges</a:t>
+            </a:r>
+            <a:r>
               <a:rPr lang="en-US" sz="3200" dirty="0" smtClean="0">
                 <a:solidFill>
                   <a:schemeClr val="bg1"/>
                 </a:solidFill>
               </a:rPr>
-              <a:t>Challenges: Data quality, test set different from train</a:t>
+              <a:t>: Data quality, test set different from train</a:t>
             </a:r>
           </a:p>
           <a:p>
             <a:pPr algn="ctr"/>
+            <a:r>
+              <a:rPr lang="en-US" sz="3200" i="1" dirty="0" smtClean="0">
+                <a:solidFill>
+                  <a:schemeClr val="bg1"/>
+                </a:solidFill>
+              </a:rPr>
+              <a:t>Approach</a:t>
+            </a:r>
             <a:r>
               <a:rPr lang="en-US" sz="3200" dirty="0" smtClean="0">
                 <a:solidFill>
                   <a:schemeClr val="bg1"/>
                 </a:solidFill>
               </a:rPr>
-              <a:t>Approach: Ensembles, exploring data enrichment</a:t>
+              <a:t>: Ensembles, exploring data enrichment</a:t>
             </a:r>
           </a:p>
           <a:p>
             <a:pPr algn="ctr"/>
+            <a:r>
+              <a:rPr lang="en-US" sz="3200" i="1" dirty="0" smtClean="0">
+                <a:solidFill>
+                  <a:schemeClr val="bg1"/>
+                </a:solidFill>
+              </a:rPr>
+              <a:t>Current rank </a:t>
+            </a:r>
             <a:r>
               <a:rPr lang="en-US" sz="3200" dirty="0" smtClean="0">
                 <a:solidFill>
                   <a:schemeClr val="bg1"/>
                 </a:solidFill>
               </a:rPr>
-              <a:t>Current rank about 720 of 2400 </a:t>
+              <a:t>about 720 of 2400 </a:t>
             </a:r>
           </a:p>
           <a:p>

</xml_diff>

<commit_message>
Updated Flashtalk pp: Final version that was used for the presentation on June
</commit_message>
<xml_diff>
--- a/Presentatie/Flashtalk 2 (Jeffrey).pptx
+++ b/Presentatie/Flashtalk 2 (Jeffrey).pptx
@@ -4874,7 +4874,7 @@
         </p:blipFill>
         <p:spPr>
           <a:xfrm>
-            <a:off x="719346" y="3629159"/>
+            <a:off x="3808535" y="3629046"/>
             <a:ext cx="4714286" cy="3361905"/>
           </a:xfrm>
           <a:prstGeom prst="rect">
@@ -4898,7 +4898,7 @@
         </p:blipFill>
         <p:spPr>
           <a:xfrm>
-            <a:off x="5914104" y="3724397"/>
+            <a:off x="8818546" y="3724397"/>
             <a:ext cx="4847619" cy="3266667"/>
           </a:xfrm>
           <a:prstGeom prst="rect">
@@ -4906,30 +4906,76 @@
           </a:prstGeom>
         </p:spPr>
       </p:pic>
-      <p:pic>
-        <p:nvPicPr>
-          <p:cNvPr id="9" name="Picture 8"/>
-          <p:cNvPicPr>
-            <a:picLocks noChangeAspect="1"/>
-          </p:cNvPicPr>
+      <p:sp>
+        <p:nvSpPr>
+          <p:cNvPr id="10" name="TextBox 9"/>
+          <p:cNvSpPr txBox="1"/>
           <p:nvPr/>
-        </p:nvPicPr>
-        <p:blipFill>
-          <a:blip r:embed="rId4"/>
-          <a:stretch>
-            <a:fillRect/>
-          </a:stretch>
-        </p:blipFill>
+        </p:nvSpPr>
         <p:spPr>
           <a:xfrm>
-            <a:off x="11242195" y="3724397"/>
-            <a:ext cx="6039931" cy="3266667"/>
+            <a:off x="3808535" y="6991064"/>
+            <a:ext cx="10058400" cy="523220"/>
           </a:xfrm>
           <a:prstGeom prst="rect">
             <a:avLst/>
           </a:prstGeom>
+          <a:noFill/>
         </p:spPr>
-      </p:pic>
+        <p:txBody>
+          <a:bodyPr wrap="square" rtlCol="0">
+            <a:spAutoFit/>
+          </a:bodyPr>
+          <a:lstStyle/>
+          <a:p>
+            <a:r>
+              <a:rPr lang="nl-NL" sz="2800" dirty="0" smtClean="0">
+                <a:latin typeface="+mn-lt"/>
+              </a:rPr>
+              <a:t>Price vs. </a:t>
+            </a:r>
+            <a:r>
+              <a:rPr lang="nl-NL" sz="2800" dirty="0" err="1" smtClean="0">
+                <a:latin typeface="+mn-lt"/>
+              </a:rPr>
+              <a:t>number</a:t>
+            </a:r>
+            <a:r>
+              <a:rPr lang="nl-NL" sz="2800" dirty="0" smtClean="0">
+                <a:latin typeface="+mn-lt"/>
+              </a:rPr>
+              <a:t> of rooms                       ..</a:t>
+            </a:r>
+            <a:r>
+              <a:rPr lang="nl-NL" sz="2800" dirty="0" err="1" smtClean="0">
+                <a:latin typeface="+mn-lt"/>
+              </a:rPr>
+              <a:t>and</a:t>
+            </a:r>
+            <a:r>
+              <a:rPr lang="nl-NL" sz="2800" dirty="0" smtClean="0">
+                <a:latin typeface="+mn-lt"/>
+              </a:rPr>
+              <a:t> # data points per </a:t>
+            </a:r>
+            <a:r>
+              <a:rPr lang="nl-NL" sz="2800" dirty="0" err="1" smtClean="0">
+                <a:latin typeface="+mn-lt"/>
+              </a:rPr>
+              <a:t>year</a:t>
+            </a:r>
+            <a:r>
+              <a:rPr lang="nl-NL" sz="2800" dirty="0" smtClean="0">
+                <a:latin typeface="+mn-lt"/>
+              </a:rPr>
+              <a:t>  </a:t>
+            </a:r>
+            <a:endParaRPr lang="nl-NL" sz="2800" dirty="0" smtClean="0">
+              <a:latin typeface="+mn-lt"/>
+            </a:endParaRPr>
+          </a:p>
+        </p:txBody>
+      </p:sp>
     </p:spTree>
     <p:extLst>
       <p:ext uri="{BB962C8B-B14F-4D97-AF65-F5344CB8AC3E}">
@@ -5116,7 +5162,7 @@
                                 </p:cTn>
                               </p:par>
                               <p:par>
-                                <p:cTn id="17" presetID="1" presetClass="entr" presetSubtype="0" fill="hold" nodeType="withEffect">
+                                <p:cTn id="17" presetID="1" presetClass="entr" presetSubtype="0" fill="hold" grpId="0" nodeType="withEffect">
                                   <p:stCondLst>
                                     <p:cond delay="0"/>
                                   </p:stCondLst>
@@ -5129,7 +5175,7 @@
                                           </p:stCondLst>
                                         </p:cTn>
                                         <p:tgtEl>
-                                          <p:spTgt spid="9"/>
+                                          <p:spTgt spid="10"/>
                                         </p:tgtEl>
                                         <p:attrNameLst>
                                           <p:attrName>style.visibility</p:attrName>
@@ -5169,6 +5215,9 @@
         </p:cTn>
       </p:par>
     </p:tnLst>
+    <p:bldLst>
+      <p:bldP spid="10" grpId="0"/>
+    </p:bldLst>
   </p:timing>
 </p:sld>
 </file>
@@ -5230,8 +5279,21 @@
           <a:p>
             <a:r>
               <a:rPr lang="en-US" dirty="0" smtClean="0"/>
-              <a:t>Missing data:  replacing with representative values, pruning, with respect to the data</a:t>
-            </a:r>
+              <a:t>Missing data:  replacing with representative values, </a:t>
+            </a:r>
+            <a:r>
+              <a:rPr lang="en-US" dirty="0" smtClean="0"/>
+              <a:t>pruning.. </a:t>
+            </a:r>
+            <a:r>
+              <a:rPr lang="en-US" dirty="0" smtClean="0"/>
+              <a:t>with respect to the </a:t>
+            </a:r>
+            <a:r>
+              <a:rPr lang="en-US" dirty="0" smtClean="0"/>
+              <a:t>data </a:t>
+            </a:r>
+            <a:endParaRPr lang="en-US" dirty="0" smtClean="0"/>
           </a:p>
           <a:p>
             <a:r>
@@ -5563,6 +5625,33 @@
                                   </p:childTnLst>
                                 </p:cTn>
                               </p:par>
+                              <p:par>
+                                <p:cTn id="15" presetID="1" presetClass="entr" presetSubtype="0" fill="hold" grpId="0" nodeType="withEffect">
+                                  <p:stCondLst>
+                                    <p:cond delay="0"/>
+                                  </p:stCondLst>
+                                  <p:childTnLst>
+                                    <p:set>
+                                      <p:cBhvr>
+                                        <p:cTn id="16" dur="1" fill="hold">
+                                          <p:stCondLst>
+                                            <p:cond delay="0"/>
+                                          </p:stCondLst>
+                                        </p:cTn>
+                                        <p:tgtEl>
+                                          <p:spTgt spid="3"/>
+                                        </p:tgtEl>
+                                        <p:attrNameLst>
+                                          <p:attrName>style.visibility</p:attrName>
+                                        </p:attrNameLst>
+                                      </p:cBhvr>
+                                      <p:to>
+                                        <p:strVal val="visible"/>
+                                      </p:to>
+                                    </p:set>
+                                  </p:childTnLst>
+                                </p:cTn>
+                              </p:par>
                             </p:childTnLst>
                           </p:cTn>
                         </p:par>
@@ -5590,6 +5679,9 @@
         </p:cTn>
       </p:par>
     </p:tnLst>
+    <p:bldLst>
+      <p:bldP spid="3" grpId="0"/>
+    </p:bldLst>
   </p:timing>
 </p:sld>
 </file>
@@ -5905,6 +5997,49 @@
           </a:p>
           <a:p>
             <a:r>
+              <a:rPr lang="nl-NL" dirty="0" err="1" smtClean="0">
+                <a:solidFill>
+                  <a:srgbClr val="B72922"/>
+                </a:solidFill>
+              </a:rPr>
+              <a:t>Restricted</a:t>
+            </a:r>
+            <a:r>
+              <a:rPr lang="nl-NL" dirty="0" smtClean="0">
+                <a:solidFill>
+                  <a:srgbClr val="B72922"/>
+                </a:solidFill>
+              </a:rPr>
+              <a:t> </a:t>
+            </a:r>
+            <a:r>
+              <a:rPr lang="nl-NL" dirty="0" err="1" smtClean="0">
+                <a:solidFill>
+                  <a:srgbClr val="B72922"/>
+                </a:solidFill>
+              </a:rPr>
+              <a:t>Boltzmann</a:t>
+            </a:r>
+            <a:r>
+              <a:rPr lang="nl-NL" dirty="0" smtClean="0">
+                <a:solidFill>
+                  <a:srgbClr val="B72922"/>
+                </a:solidFill>
+              </a:rPr>
+              <a:t> Machines </a:t>
+            </a:r>
+            <a:r>
+              <a:rPr lang="nl-NL" dirty="0" err="1" smtClean="0"/>
+              <a:t>for</a:t>
+            </a:r>
+            <a:r>
+              <a:rPr lang="nl-NL" dirty="0" smtClean="0"/>
+              <a:t> missing data</a:t>
+            </a:r>
+            <a:endParaRPr lang="nl-NL" dirty="0" smtClean="0"/>
+          </a:p>
+          <a:p>
+            <a:r>
               <a:rPr lang="en-US" dirty="0" smtClean="0"/>
               <a:t>Dealing with </a:t>
             </a:r>
@@ -5914,8 +6049,33 @@
                   <a:srgbClr val="B72922"/>
                 </a:solidFill>
               </a:rPr>
-              <a:t>anomalous data</a:t>
-            </a:r>
+              <a:t>anomalous </a:t>
+            </a:r>
+            <a:r>
+              <a:rPr lang="en-US" dirty="0" smtClean="0">
+                <a:solidFill>
+                  <a:srgbClr val="B72922"/>
+                </a:solidFill>
+              </a:rPr>
+              <a:t>data </a:t>
+            </a:r>
+            <a:r>
+              <a:rPr lang="en-US" dirty="0" smtClean="0"/>
+              <a:t>(e.g. </a:t>
+            </a:r>
+            <a:r>
+              <a:rPr lang="en-US" dirty="0" smtClean="0">
+                <a:solidFill>
+                  <a:srgbClr val="B72922"/>
+                </a:solidFill>
+              </a:rPr>
+              <a:t>fraud</a:t>
+            </a:r>
+            <a:r>
+              <a:rPr lang="en-US" dirty="0" smtClean="0"/>
+              <a:t>)</a:t>
+            </a:r>
+            <a:endParaRPr lang="en-US" dirty="0" smtClean="0"/>
           </a:p>
           <a:p>
             <a:r>
@@ -5944,8 +6104,19 @@
             </a:r>
             <a:r>
               <a:rPr lang="en-US" dirty="0" smtClean="0"/>
-              <a:t> set issues</a:t>
-            </a:r>
+              <a:t> </a:t>
+            </a:r>
+            <a:r>
+              <a:rPr lang="en-US" dirty="0" smtClean="0"/>
+              <a:t>set issues</a:t>
+            </a:r>
+          </a:p>
+          <a:p>
+            <a:r>
+              <a:rPr lang="en-US" dirty="0" smtClean="0"/>
+              <a:t>Correcting for economic climate</a:t>
+            </a:r>
+            <a:endParaRPr lang="en-US" dirty="0" smtClean="0"/>
           </a:p>
           <a:p>
             <a:r>
@@ -6184,6 +6355,104 @@
                       </p:childTnLst>
                     </p:cTn>
                   </p:par>
+                  <p:par>
+                    <p:cTn id="19" fill="hold">
+                      <p:stCondLst>
+                        <p:cond delay="indefinite"/>
+                      </p:stCondLst>
+                      <p:childTnLst>
+                        <p:par>
+                          <p:cTn id="20" fill="hold">
+                            <p:stCondLst>
+                              <p:cond delay="0"/>
+                            </p:stCondLst>
+                            <p:childTnLst>
+                              <p:par>
+                                <p:cTn id="21" presetID="1" presetClass="entr" presetSubtype="0" fill="hold" nodeType="clickEffect">
+                                  <p:stCondLst>
+                                    <p:cond delay="0"/>
+                                  </p:stCondLst>
+                                  <p:childTnLst>
+                                    <p:set>
+                                      <p:cBhvr>
+                                        <p:cTn id="22" dur="1" fill="hold">
+                                          <p:stCondLst>
+                                            <p:cond delay="0"/>
+                                          </p:stCondLst>
+                                        </p:cTn>
+                                        <p:tgtEl>
+                                          <p:spTgt spid="5">
+                                            <p:txEl>
+                                              <p:pRg st="4" end="4"/>
+                                            </p:txEl>
+                                          </p:spTgt>
+                                        </p:tgtEl>
+                                        <p:attrNameLst>
+                                          <p:attrName>style.visibility</p:attrName>
+                                        </p:attrNameLst>
+                                      </p:cBhvr>
+                                      <p:to>
+                                        <p:strVal val="visible"/>
+                                      </p:to>
+                                    </p:set>
+                                  </p:childTnLst>
+                                </p:cTn>
+                              </p:par>
+                            </p:childTnLst>
+                          </p:cTn>
+                        </p:par>
+                      </p:childTnLst>
+                    </p:cTn>
+                  </p:par>
+                  <p:par>
+                    <p:cTn id="23" fill="hold">
+                      <p:stCondLst>
+                        <p:cond delay="indefinite"/>
+                      </p:stCondLst>
+                      <p:childTnLst>
+                        <p:par>
+                          <p:cTn id="24" fill="hold">
+                            <p:stCondLst>
+                              <p:cond delay="0"/>
+                            </p:stCondLst>
+                            <p:childTnLst>
+                              <p:par>
+                                <p:cTn id="25" presetID="1" presetClass="entr" presetSubtype="0" fill="hold" nodeType="clickEffect">
+                                  <p:stCondLst>
+                                    <p:cond delay="0"/>
+                                  </p:stCondLst>
+                                  <p:childTnLst>
+                                    <p:set>
+                                      <p:cBhvr>
+                                        <p:cTn id="26" dur="1" fill="hold">
+                                          <p:stCondLst>
+                                            <p:cond delay="0"/>
+                                          </p:stCondLst>
+                                        </p:cTn>
+                                        <p:tgtEl>
+                                          <p:spTgt spid="5">
+                                            <p:txEl>
+                                              <p:pRg st="5" end="5"/>
+                                            </p:txEl>
+                                          </p:spTgt>
+                                        </p:tgtEl>
+                                        <p:attrNameLst>
+                                          <p:attrName>style.visibility</p:attrName>
+                                        </p:attrNameLst>
+                                      </p:cBhvr>
+                                      <p:to>
+                                        <p:strVal val="visible"/>
+                                      </p:to>
+                                    </p:set>
+                                  </p:childTnLst>
+                                </p:cTn>
+                              </p:par>
+                            </p:childTnLst>
+                          </p:cTn>
+                        </p:par>
+                      </p:childTnLst>
+                    </p:cTn>
+                  </p:par>
                 </p:childTnLst>
               </p:cTn>
               <p:prevCondLst>
@@ -6357,7 +6626,23 @@
                   <a:schemeClr val="bg1"/>
                 </a:solidFill>
               </a:rPr>
-              <a:t>: Ensembles, exploring data enrichment</a:t>
+              <a:t>: Ensembles, </a:t>
+            </a:r>
+            <a:r>
+              <a:rPr lang="en-US" sz="3200" dirty="0" smtClean="0">
+                <a:solidFill>
+                  <a:schemeClr val="bg1"/>
+                </a:solidFill>
+              </a:rPr>
+              <a:t>data </a:t>
+            </a:r>
+            <a:r>
+              <a:rPr lang="en-US" sz="3200" dirty="0" smtClean="0">
+                <a:solidFill>
+                  <a:schemeClr val="bg1"/>
+                </a:solidFill>
+              </a:rPr>
+              <a:t>enrichment</a:t>
             </a:r>
           </a:p>
           <a:p>

</xml_diff>